<commit_message>
Adding Background and Related Work Sections
</commit_message>
<xml_diff>
--- a/Thesis Idea.pptx
+++ b/Thesis Idea.pptx
@@ -6,11 +6,13 @@
   </p:sldMasterIdLst>
   <p:sldIdLst>
     <p:sldId id="256" r:id="rId2"/>
-    <p:sldId id="259" r:id="rId3"/>
-    <p:sldId id="257" r:id="rId4"/>
-    <p:sldId id="261" r:id="rId5"/>
-    <p:sldId id="258" r:id="rId6"/>
-    <p:sldId id="260" r:id="rId7"/>
+    <p:sldId id="262" r:id="rId3"/>
+    <p:sldId id="259" r:id="rId4"/>
+    <p:sldId id="257" r:id="rId5"/>
+    <p:sldId id="261" r:id="rId6"/>
+    <p:sldId id="258" r:id="rId7"/>
+    <p:sldId id="260" r:id="rId8"/>
+    <p:sldId id="263" r:id="rId9"/>
   </p:sldIdLst>
   <p:sldSz cx="12192000" cy="6858000"/>
   <p:notesSz cx="6858000" cy="9144000"/>
@@ -264,7 +266,7 @@
           <a:p>
             <a:fld id="{00284868-4315-4427-9D14-6A5CD0C97C48}" type="datetimeFigureOut">
               <a:rPr lang="en-US" smtClean="0"/>
-              <a:t>10/14/2020</a:t>
+              <a:t>10/21/20</a:t>
             </a:fld>
             <a:endParaRPr lang="en-US"/>
           </a:p>
@@ -462,7 +464,7 @@
           <a:p>
             <a:fld id="{00284868-4315-4427-9D14-6A5CD0C97C48}" type="datetimeFigureOut">
               <a:rPr lang="en-US" smtClean="0"/>
-              <a:t>10/14/2020</a:t>
+              <a:t>10/21/20</a:t>
             </a:fld>
             <a:endParaRPr lang="en-US"/>
           </a:p>
@@ -670,7 +672,7 @@
           <a:p>
             <a:fld id="{00284868-4315-4427-9D14-6A5CD0C97C48}" type="datetimeFigureOut">
               <a:rPr lang="en-US" smtClean="0"/>
-              <a:t>10/14/2020</a:t>
+              <a:t>10/21/20</a:t>
             </a:fld>
             <a:endParaRPr lang="en-US"/>
           </a:p>
@@ -868,7 +870,7 @@
           <a:p>
             <a:fld id="{00284868-4315-4427-9D14-6A5CD0C97C48}" type="datetimeFigureOut">
               <a:rPr lang="en-US" smtClean="0"/>
-              <a:t>10/14/2020</a:t>
+              <a:t>10/21/20</a:t>
             </a:fld>
             <a:endParaRPr lang="en-US"/>
           </a:p>
@@ -1143,7 +1145,7 @@
           <a:p>
             <a:fld id="{00284868-4315-4427-9D14-6A5CD0C97C48}" type="datetimeFigureOut">
               <a:rPr lang="en-US" smtClean="0"/>
-              <a:t>10/14/2020</a:t>
+              <a:t>10/21/20</a:t>
             </a:fld>
             <a:endParaRPr lang="en-US"/>
           </a:p>
@@ -1408,7 +1410,7 @@
           <a:p>
             <a:fld id="{00284868-4315-4427-9D14-6A5CD0C97C48}" type="datetimeFigureOut">
               <a:rPr lang="en-US" smtClean="0"/>
-              <a:t>10/14/2020</a:t>
+              <a:t>10/21/20</a:t>
             </a:fld>
             <a:endParaRPr lang="en-US"/>
           </a:p>
@@ -1820,7 +1822,7 @@
           <a:p>
             <a:fld id="{00284868-4315-4427-9D14-6A5CD0C97C48}" type="datetimeFigureOut">
               <a:rPr lang="en-US" smtClean="0"/>
-              <a:t>10/14/2020</a:t>
+              <a:t>10/21/20</a:t>
             </a:fld>
             <a:endParaRPr lang="en-US"/>
           </a:p>
@@ -1961,7 +1963,7 @@
           <a:p>
             <a:fld id="{00284868-4315-4427-9D14-6A5CD0C97C48}" type="datetimeFigureOut">
               <a:rPr lang="en-US" smtClean="0"/>
-              <a:t>10/14/2020</a:t>
+              <a:t>10/21/20</a:t>
             </a:fld>
             <a:endParaRPr lang="en-US"/>
           </a:p>
@@ -2074,7 +2076,7 @@
           <a:p>
             <a:fld id="{00284868-4315-4427-9D14-6A5CD0C97C48}" type="datetimeFigureOut">
               <a:rPr lang="en-US" smtClean="0"/>
-              <a:t>10/14/2020</a:t>
+              <a:t>10/21/20</a:t>
             </a:fld>
             <a:endParaRPr lang="en-US"/>
           </a:p>
@@ -2385,7 +2387,7 @@
           <a:p>
             <a:fld id="{00284868-4315-4427-9D14-6A5CD0C97C48}" type="datetimeFigureOut">
               <a:rPr lang="en-US" smtClean="0"/>
-              <a:t>10/14/2020</a:t>
+              <a:t>10/21/20</a:t>
             </a:fld>
             <a:endParaRPr lang="en-US"/>
           </a:p>
@@ -2673,7 +2675,7 @@
           <a:p>
             <a:fld id="{00284868-4315-4427-9D14-6A5CD0C97C48}" type="datetimeFigureOut">
               <a:rPr lang="en-US" smtClean="0"/>
-              <a:t>10/14/2020</a:t>
+              <a:t>10/21/20</a:t>
             </a:fld>
             <a:endParaRPr lang="en-US"/>
           </a:p>
@@ -2914,7 +2916,7 @@
           <a:p>
             <a:fld id="{00284868-4315-4427-9D14-6A5CD0C97C48}" type="datetimeFigureOut">
               <a:rPr lang="en-US" smtClean="0"/>
-              <a:t>10/14/2020</a:t>
+              <a:t>10/21/20</a:t>
             </a:fld>
             <a:endParaRPr lang="en-US"/>
           </a:p>
@@ -3422,7 +3424,7 @@
           <p:cNvPr id="2" name="Title 1">
             <a:extLst>
               <a:ext uri="{FF2B5EF4-FFF2-40B4-BE49-F238E27FC236}">
-                <a16:creationId xmlns:a16="http://schemas.microsoft.com/office/drawing/2014/main" id="{03008994-6FA0-4D21-9B0C-D6205F90424A}"/>
+                <a16:creationId xmlns:a16="http://schemas.microsoft.com/office/drawing/2014/main" id="{1141B509-9E2B-2F49-A226-AB46AEB2B901}"/>
               </a:ext>
             </a:extLst>
           </p:cNvPr>
@@ -3439,36 +3441,40 @@
           <a:lstStyle/>
           <a:p>
             <a:r>
+              <a:rPr lang="en-US" dirty="0">
+                <a:highlight>
+                  <a:srgbClr val="FFFF00"/>
+                </a:highlight>
+              </a:rPr>
+              <a:t>Context (Laying out the problem)</a:t>
+            </a:r>
+          </a:p>
+        </p:txBody>
+      </p:sp>
+      <p:sp>
+        <p:nvSpPr>
+          <p:cNvPr id="3" name="Content Placeholder 2">
+            <a:extLst>
+              <a:ext uri="{FF2B5EF4-FFF2-40B4-BE49-F238E27FC236}">
+                <a16:creationId xmlns:a16="http://schemas.microsoft.com/office/drawing/2014/main" id="{B8898F6A-3124-5A47-95A6-28BEC14098BE}"/>
+              </a:ext>
+            </a:extLst>
+          </p:cNvPr>
+          <p:cNvSpPr>
+            <a:spLocks noGrp="1"/>
+          </p:cNvSpPr>
+          <p:nvPr>
+            <p:ph idx="1"/>
+          </p:nvPr>
+        </p:nvSpPr>
+        <p:spPr/>
+        <p:txBody>
+          <a:bodyPr/>
+          <a:lstStyle/>
+          <a:p>
+            <a:r>
               <a:rPr lang="en-US" dirty="0"/>
-              <a:t>Hypothesis</a:t>
-            </a:r>
-          </a:p>
-        </p:txBody>
-      </p:sp>
-      <p:sp>
-        <p:nvSpPr>
-          <p:cNvPr id="3" name="Content Placeholder 2">
-            <a:extLst>
-              <a:ext uri="{FF2B5EF4-FFF2-40B4-BE49-F238E27FC236}">
-                <a16:creationId xmlns:a16="http://schemas.microsoft.com/office/drawing/2014/main" id="{0BD8DFCA-0D29-4D97-8A62-B89BC8479798}"/>
-              </a:ext>
-            </a:extLst>
-          </p:cNvPr>
-          <p:cNvSpPr>
-            <a:spLocks noGrp="1"/>
-          </p:cNvSpPr>
-          <p:nvPr>
-            <p:ph idx="1"/>
-          </p:nvPr>
-        </p:nvSpPr>
-        <p:spPr/>
-        <p:txBody>
-          <a:bodyPr/>
-          <a:lstStyle/>
-          <a:p>
-            <a:r>
-              <a:rPr lang="en-US" dirty="0"/>
-              <a:t>TODO once more info is gathered</a:t>
+              <a:t>TODO</a:t>
             </a:r>
           </a:p>
         </p:txBody>
@@ -3476,7 +3482,7 @@
     </p:spTree>
     <p:extLst>
       <p:ext uri="{BB962C8B-B14F-4D97-AF65-F5344CB8AC3E}">
-        <p14:creationId xmlns:p14="http://schemas.microsoft.com/office/powerpoint/2010/main" val="2693886467"/>
+        <p14:creationId xmlns:p14="http://schemas.microsoft.com/office/powerpoint/2010/main" val="1823864913"/>
       </p:ext>
     </p:extLst>
   </p:cSld>
@@ -3508,7 +3514,7 @@
           <p:cNvPr id="2" name="Title 1">
             <a:extLst>
               <a:ext uri="{FF2B5EF4-FFF2-40B4-BE49-F238E27FC236}">
-                <a16:creationId xmlns:a16="http://schemas.microsoft.com/office/drawing/2014/main" id="{57C7A2E1-DBA9-4238-BAC3-FEF419F040A3}"/>
+                <a16:creationId xmlns:a16="http://schemas.microsoft.com/office/drawing/2014/main" id="{03008994-6FA0-4D21-9B0C-D6205F90424A}"/>
               </a:ext>
             </a:extLst>
           </p:cNvPr>
@@ -3526,7 +3532,7 @@
           <a:p>
             <a:r>
               <a:rPr lang="en-US" dirty="0"/>
-              <a:t>Research questions</a:t>
+              <a:t>Hypothesis</a:t>
             </a:r>
           </a:p>
         </p:txBody>
@@ -3536,7 +3542,7 @@
           <p:cNvPr id="3" name="Content Placeholder 2">
             <a:extLst>
               <a:ext uri="{FF2B5EF4-FFF2-40B4-BE49-F238E27FC236}">
-                <a16:creationId xmlns:a16="http://schemas.microsoft.com/office/drawing/2014/main" id="{BDD241C9-4047-46B8-AC41-C8187A310B71}"/>
+                <a16:creationId xmlns:a16="http://schemas.microsoft.com/office/drawing/2014/main" id="{0BD8DFCA-0D29-4D97-8A62-B89BC8479798}"/>
               </a:ext>
             </a:extLst>
           </p:cNvPr>
@@ -3554,40 +3560,15 @@
           <a:p>
             <a:r>
               <a:rPr lang="en-US" dirty="0"/>
-              <a:t>How does level of software engineering experience influence the approach to typical software engineering questions?</a:t>
-            </a:r>
-          </a:p>
-          <a:p>
-            <a:pPr lvl="1"/>
-            <a:r>
-              <a:rPr lang="en-US" dirty="0"/>
-              <a:t>Does level of engineering experience also affect how participants approach the questions(electrical vs mechanical vs bio)?</a:t>
-            </a:r>
-          </a:p>
-          <a:p>
-            <a:pPr lvl="1"/>
-            <a:r>
-              <a:rPr lang="en-US" dirty="0"/>
-              <a:t>How does stress level and though pattern change as participant continue software testing?</a:t>
-            </a:r>
-          </a:p>
-          <a:p>
-            <a:pPr lvl="1"/>
-            <a:r>
-              <a:rPr lang="en-US" dirty="0"/>
-              <a:t>What other methods can affect the way participants approach the software engineering problems?</a:t>
-            </a:r>
-          </a:p>
-          <a:p>
-            <a:pPr lvl="1"/>
-            <a:endParaRPr lang="en-US" dirty="0"/>
+              <a:t>TODO once more info is gathered</a:t>
+            </a:r>
           </a:p>
         </p:txBody>
       </p:sp>
     </p:spTree>
     <p:extLst>
       <p:ext uri="{BB962C8B-B14F-4D97-AF65-F5344CB8AC3E}">
-        <p14:creationId xmlns:p14="http://schemas.microsoft.com/office/powerpoint/2010/main" val="2606051116"/>
+        <p14:creationId xmlns:p14="http://schemas.microsoft.com/office/powerpoint/2010/main" val="2693886467"/>
       </p:ext>
     </p:extLst>
   </p:cSld>
@@ -3619,7 +3600,7 @@
           <p:cNvPr id="2" name="Title 1">
             <a:extLst>
               <a:ext uri="{FF2B5EF4-FFF2-40B4-BE49-F238E27FC236}">
-                <a16:creationId xmlns:a16="http://schemas.microsoft.com/office/drawing/2014/main" id="{0F1564A2-D0FC-4B21-B5FB-EBB0074998EB}"/>
+                <a16:creationId xmlns:a16="http://schemas.microsoft.com/office/drawing/2014/main" id="{57C7A2E1-DBA9-4238-BAC3-FEF419F040A3}"/>
               </a:ext>
             </a:extLst>
           </p:cNvPr>
@@ -3637,13 +3618,8 @@
           <a:p>
             <a:r>
               <a:rPr lang="en-US" dirty="0"/>
-              <a:t>Possible alternate research questions using </a:t>
-            </a:r>
-            <a:r>
-              <a:rPr lang="en-US"/>
-              <a:t>Emotiv</a:t>
-            </a:r>
-            <a:endParaRPr lang="en-US" dirty="0"/>
+              <a:t>Research questions</a:t>
+            </a:r>
           </a:p>
         </p:txBody>
       </p:sp>
@@ -3652,7 +3628,7 @@
           <p:cNvPr id="3" name="Content Placeholder 2">
             <a:extLst>
               <a:ext uri="{FF2B5EF4-FFF2-40B4-BE49-F238E27FC236}">
-                <a16:creationId xmlns:a16="http://schemas.microsoft.com/office/drawing/2014/main" id="{B3763825-2DB8-4D30-B735-872DFF0AAA05}"/>
+                <a16:creationId xmlns:a16="http://schemas.microsoft.com/office/drawing/2014/main" id="{BDD241C9-4047-46B8-AC41-C8187A310B71}"/>
               </a:ext>
             </a:extLst>
           </p:cNvPr>
@@ -3670,40 +3646,32 @@
           <a:p>
             <a:r>
               <a:rPr lang="en-US" dirty="0"/>
-              <a:t>Can a user control an external device using only the emotive</a:t>
-            </a:r>
-            <a:br>
+              <a:t>How does level of software engineering experience influence the approach to typical software engineering questions?</a:t>
+            </a:r>
+          </a:p>
+          <a:p>
+            <a:pPr lvl="1"/>
+            <a:r>
               <a:rPr lang="en-US" dirty="0"/>
-            </a:br>
-            <a:r>
-              <a:rPr lang="en-US" dirty="0">
-                <a:hlinkClick r:id="rId2"/>
-              </a:rPr>
-              <a:t>https://www.ncbi.nlm.nih.gov/pmc/articles/PMC6305548/</a:t>
-            </a:r>
-            <a:endParaRPr lang="en-US" dirty="0"/>
-          </a:p>
-          <a:p>
-            <a:endParaRPr lang="en-US" dirty="0"/>
-          </a:p>
-          <a:p>
+              <a:t>Does level of engineering experience also affect how participants approach the questions(electrical vs mechanical vs bio)?</a:t>
+            </a:r>
+          </a:p>
+          <a:p>
+            <a:pPr lvl="1"/>
             <a:r>
               <a:rPr lang="en-US" dirty="0"/>
-              <a:t>Using </a:t>
-            </a:r>
-            <a:r>
-              <a:rPr lang="en-US" dirty="0" err="1"/>
-              <a:t>eeg</a:t>
-            </a:r>
+              <a:t>How does stress level and though pattern change as participant continue software testing?</a:t>
+            </a:r>
+          </a:p>
+          <a:p>
+            <a:pPr lvl="1"/>
             <a:r>
               <a:rPr lang="en-US" dirty="0"/>
-              <a:t> (emotive) can the signals be converted into what the user wants to type/see (univ of Chicago paper)</a:t>
-            </a:r>
-          </a:p>
-          <a:p>
-            <a:endParaRPr lang="en-US" dirty="0"/>
-          </a:p>
-          <a:p>
+              <a:t>What other methods can affect the way participants approach the software engineering problems?</a:t>
+            </a:r>
+          </a:p>
+          <a:p>
+            <a:pPr lvl="1"/>
             <a:endParaRPr lang="en-US" dirty="0"/>
           </a:p>
         </p:txBody>
@@ -3711,7 +3679,7 @@
     </p:spTree>
     <p:extLst>
       <p:ext uri="{BB962C8B-B14F-4D97-AF65-F5344CB8AC3E}">
-        <p14:creationId xmlns:p14="http://schemas.microsoft.com/office/powerpoint/2010/main" val="1061379925"/>
+        <p14:creationId xmlns:p14="http://schemas.microsoft.com/office/powerpoint/2010/main" val="2606051116"/>
       </p:ext>
     </p:extLst>
   </p:cSld>
@@ -3743,7 +3711,7 @@
           <p:cNvPr id="2" name="Title 1">
             <a:extLst>
               <a:ext uri="{FF2B5EF4-FFF2-40B4-BE49-F238E27FC236}">
-                <a16:creationId xmlns:a16="http://schemas.microsoft.com/office/drawing/2014/main" id="{900D3EDC-709B-470A-BE2B-D5D0E3E9CF0F}"/>
+                <a16:creationId xmlns:a16="http://schemas.microsoft.com/office/drawing/2014/main" id="{0F1564A2-D0FC-4B21-B5FB-EBB0074998EB}"/>
               </a:ext>
             </a:extLst>
           </p:cNvPr>
@@ -3761,8 +3729,13 @@
           <a:p>
             <a:r>
               <a:rPr lang="en-US" dirty="0"/>
-              <a:t>How to test</a:t>
-            </a:r>
+              <a:t>Possible alternate research questions using </a:t>
+            </a:r>
+            <a:r>
+              <a:rPr lang="en-US"/>
+              <a:t>Emotiv</a:t>
+            </a:r>
+            <a:endParaRPr lang="en-US" dirty="0"/>
           </a:p>
         </p:txBody>
       </p:sp>
@@ -3771,7 +3744,7 @@
           <p:cNvPr id="3" name="Content Placeholder 2">
             <a:extLst>
               <a:ext uri="{FF2B5EF4-FFF2-40B4-BE49-F238E27FC236}">
-                <a16:creationId xmlns:a16="http://schemas.microsoft.com/office/drawing/2014/main" id="{B8722481-0227-4561-90A2-27DA15F4CB6B}"/>
+                <a16:creationId xmlns:a16="http://schemas.microsoft.com/office/drawing/2014/main" id="{B3763825-2DB8-4D30-B735-872DFF0AAA05}"/>
               </a:ext>
             </a:extLst>
           </p:cNvPr>
@@ -3784,63 +3757,45 @@
         </p:nvSpPr>
         <p:spPr/>
         <p:txBody>
-          <a:bodyPr>
-            <a:normAutofit lnSpcReduction="10000"/>
-          </a:bodyPr>
+          <a:bodyPr/>
           <a:lstStyle/>
           <a:p>
             <a:r>
               <a:rPr lang="en-US" dirty="0"/>
-              <a:t>4 levels of software engineering questions. Basic code(hello world in language participant doesn’t know), easy problem(building skyline problem), moderate problem(ride wait times), </a:t>
+              <a:t>Can a user control an external device using only the emotive</a:t>
+            </a:r>
+            <a:br>
+              <a:rPr lang="en-US" dirty="0"/>
+            </a:br>
+            <a:r>
+              <a:rPr lang="en-US" dirty="0">
+                <a:hlinkClick r:id="rId2"/>
+              </a:rPr>
+              <a:t>https://www.ncbi.nlm.nih.gov/pmc/articles/PMC6305548/</a:t>
+            </a:r>
+            <a:endParaRPr lang="en-US" dirty="0"/>
+          </a:p>
+          <a:p>
+            <a:endParaRPr lang="en-US" dirty="0"/>
+          </a:p>
+          <a:p>
+            <a:r>
+              <a:rPr lang="en-US" dirty="0"/>
+              <a:t>Using </a:t>
             </a:r>
             <a:r>
               <a:rPr lang="en-US" dirty="0" err="1"/>
-              <a:t>hardish</a:t>
+              <a:t>eeg</a:t>
             </a:r>
             <a:r>
               <a:rPr lang="en-US" dirty="0"/>
-              <a:t> problem(knapsack)</a:t>
-            </a:r>
-          </a:p>
-          <a:p>
-            <a:r>
-              <a:rPr lang="en-US" dirty="0"/>
-              <a:t>Participants from different disciplines, Electrical, Bio, Physics/Math, Language arts</a:t>
-            </a:r>
-          </a:p>
-          <a:p>
-            <a:r>
-              <a:rPr lang="en-US" dirty="0"/>
-              <a:t>Participants in different states of software engineering career, freshmen vs senior's vs grad vs prof.</a:t>
-            </a:r>
-          </a:p>
-          <a:p>
-            <a:r>
-              <a:rPr lang="en-US" dirty="0"/>
-              <a:t>Measure brain activity, heart rate and reaction of participants. </a:t>
-            </a:r>
-          </a:p>
-          <a:p>
-            <a:r>
-              <a:rPr lang="en-US" dirty="0" err="1"/>
-              <a:t>Emotiv</a:t>
-            </a:r>
-            <a:r>
-              <a:rPr lang="en-US" dirty="0"/>
-              <a:t> </a:t>
-            </a:r>
-            <a:r>
-              <a:rPr lang="en-US" dirty="0" err="1"/>
-              <a:t>Epoc</a:t>
-            </a:r>
-            <a:r>
-              <a:rPr lang="en-US" dirty="0"/>
-              <a:t> X 14 </a:t>
-            </a:r>
-            <a:r>
-              <a:rPr lang="en-US" dirty="0" err="1"/>
-              <a:t>brainware</a:t>
-            </a:r>
+              <a:t> (emotive) can the signals be converted into what the user wants to type/see (univ of Chicago paper)</a:t>
+            </a:r>
+          </a:p>
+          <a:p>
+            <a:endParaRPr lang="en-US" dirty="0"/>
+          </a:p>
+          <a:p>
             <a:endParaRPr lang="en-US" dirty="0"/>
           </a:p>
         </p:txBody>
@@ -3848,7 +3803,7 @@
     </p:spTree>
     <p:extLst>
       <p:ext uri="{BB962C8B-B14F-4D97-AF65-F5344CB8AC3E}">
-        <p14:creationId xmlns:p14="http://schemas.microsoft.com/office/powerpoint/2010/main" val="3313867477"/>
+        <p14:creationId xmlns:p14="http://schemas.microsoft.com/office/powerpoint/2010/main" val="1061379925"/>
       </p:ext>
     </p:extLst>
   </p:cSld>
@@ -3880,6 +3835,143 @@
           <p:cNvPr id="2" name="Title 1">
             <a:extLst>
               <a:ext uri="{FF2B5EF4-FFF2-40B4-BE49-F238E27FC236}">
+                <a16:creationId xmlns:a16="http://schemas.microsoft.com/office/drawing/2014/main" id="{900D3EDC-709B-470A-BE2B-D5D0E3E9CF0F}"/>
+              </a:ext>
+            </a:extLst>
+          </p:cNvPr>
+          <p:cNvSpPr>
+            <a:spLocks noGrp="1"/>
+          </p:cNvSpPr>
+          <p:nvPr>
+            <p:ph type="title"/>
+          </p:nvPr>
+        </p:nvSpPr>
+        <p:spPr/>
+        <p:txBody>
+          <a:bodyPr/>
+          <a:lstStyle/>
+          <a:p>
+            <a:r>
+              <a:rPr lang="en-US" dirty="0"/>
+              <a:t>How to test</a:t>
+            </a:r>
+          </a:p>
+        </p:txBody>
+      </p:sp>
+      <p:sp>
+        <p:nvSpPr>
+          <p:cNvPr id="3" name="Content Placeholder 2">
+            <a:extLst>
+              <a:ext uri="{FF2B5EF4-FFF2-40B4-BE49-F238E27FC236}">
+                <a16:creationId xmlns:a16="http://schemas.microsoft.com/office/drawing/2014/main" id="{B8722481-0227-4561-90A2-27DA15F4CB6B}"/>
+              </a:ext>
+            </a:extLst>
+          </p:cNvPr>
+          <p:cNvSpPr>
+            <a:spLocks noGrp="1"/>
+          </p:cNvSpPr>
+          <p:nvPr>
+            <p:ph idx="1"/>
+          </p:nvPr>
+        </p:nvSpPr>
+        <p:spPr/>
+        <p:txBody>
+          <a:bodyPr>
+            <a:normAutofit lnSpcReduction="10000"/>
+          </a:bodyPr>
+          <a:lstStyle/>
+          <a:p>
+            <a:r>
+              <a:rPr lang="en-US" dirty="0"/>
+              <a:t>4 levels of software engineering questions. Basic code(hello world in language participant doesn’t know), easy problem(building skyline problem), moderate problem(ride wait times), </a:t>
+            </a:r>
+            <a:r>
+              <a:rPr lang="en-US" dirty="0" err="1"/>
+              <a:t>hardish</a:t>
+            </a:r>
+            <a:r>
+              <a:rPr lang="en-US" dirty="0"/>
+              <a:t> problem(knapsack)</a:t>
+            </a:r>
+          </a:p>
+          <a:p>
+            <a:r>
+              <a:rPr lang="en-US" dirty="0"/>
+              <a:t>Participants from different disciplines, Electrical, Bio, Physics/Math, Language arts</a:t>
+            </a:r>
+          </a:p>
+          <a:p>
+            <a:r>
+              <a:rPr lang="en-US" dirty="0"/>
+              <a:t>Participants in different states of software engineering career, freshmen vs senior's vs grad vs prof.</a:t>
+            </a:r>
+          </a:p>
+          <a:p>
+            <a:r>
+              <a:rPr lang="en-US" dirty="0"/>
+              <a:t>Measure brain activity, heart rate and reaction of participants. </a:t>
+            </a:r>
+          </a:p>
+          <a:p>
+            <a:r>
+              <a:rPr lang="en-US" dirty="0" err="1"/>
+              <a:t>Emotiv</a:t>
+            </a:r>
+            <a:r>
+              <a:rPr lang="en-US" dirty="0"/>
+              <a:t> </a:t>
+            </a:r>
+            <a:r>
+              <a:rPr lang="en-US" dirty="0" err="1"/>
+              <a:t>Epoc</a:t>
+            </a:r>
+            <a:r>
+              <a:rPr lang="en-US" dirty="0"/>
+              <a:t> X 14 </a:t>
+            </a:r>
+            <a:r>
+              <a:rPr lang="en-US" dirty="0" err="1"/>
+              <a:t>brainware</a:t>
+            </a:r>
+            <a:endParaRPr lang="en-US" dirty="0"/>
+          </a:p>
+        </p:txBody>
+      </p:sp>
+    </p:spTree>
+    <p:extLst>
+      <p:ext uri="{BB962C8B-B14F-4D97-AF65-F5344CB8AC3E}">
+        <p14:creationId xmlns:p14="http://schemas.microsoft.com/office/powerpoint/2010/main" val="3313867477"/>
+      </p:ext>
+    </p:extLst>
+  </p:cSld>
+  <p:clrMapOvr>
+    <a:masterClrMapping/>
+  </p:clrMapOvr>
+</p:sld>
+</file>
+
+<file path=ppt/slides/slide7.xml><?xml version="1.0" encoding="utf-8"?>
+<p:sld xmlns:a="http://schemas.openxmlformats.org/drawingml/2006/main" xmlns:r="http://schemas.openxmlformats.org/officeDocument/2006/relationships" xmlns:p="http://schemas.openxmlformats.org/presentationml/2006/main">
+  <p:cSld>
+    <p:spTree>
+      <p:nvGrpSpPr>
+        <p:cNvPr id="1" name=""/>
+        <p:cNvGrpSpPr/>
+        <p:nvPr/>
+      </p:nvGrpSpPr>
+      <p:grpSpPr>
+        <a:xfrm>
+          <a:off x="0" y="0"/>
+          <a:ext cx="0" cy="0"/>
+          <a:chOff x="0" y="0"/>
+          <a:chExt cx="0" cy="0"/>
+        </a:xfrm>
+      </p:grpSpPr>
+      <p:sp>
+        <p:nvSpPr>
+          <p:cNvPr id="2" name="Title 1">
+            <a:extLst>
+              <a:ext uri="{FF2B5EF4-FFF2-40B4-BE49-F238E27FC236}">
                 <a16:creationId xmlns:a16="http://schemas.microsoft.com/office/drawing/2014/main" id="{1533386A-88CF-4A54-8521-9FB355EE2EB7}"/>
               </a:ext>
             </a:extLst>
@@ -3961,6 +4053,426 @@
     <p:extLst>
       <p:ext uri="{BB962C8B-B14F-4D97-AF65-F5344CB8AC3E}">
         <p14:creationId xmlns:p14="http://schemas.microsoft.com/office/powerpoint/2010/main" val="3366634136"/>
+      </p:ext>
+    </p:extLst>
+  </p:cSld>
+  <p:clrMapOvr>
+    <a:masterClrMapping/>
+  </p:clrMapOvr>
+</p:sld>
+</file>
+
+<file path=ppt/slides/slide8.xml><?xml version="1.0" encoding="utf-8"?>
+<p:sld xmlns:a="http://schemas.openxmlformats.org/drawingml/2006/main" xmlns:r="http://schemas.openxmlformats.org/officeDocument/2006/relationships" xmlns:p="http://schemas.openxmlformats.org/presentationml/2006/main">
+  <p:cSld>
+    <p:spTree>
+      <p:nvGrpSpPr>
+        <p:cNvPr id="1" name=""/>
+        <p:cNvGrpSpPr/>
+        <p:nvPr/>
+      </p:nvGrpSpPr>
+      <p:grpSpPr>
+        <a:xfrm>
+          <a:off x="0" y="0"/>
+          <a:ext cx="0" cy="0"/>
+          <a:chOff x="0" y="0"/>
+          <a:chExt cx="0" cy="0"/>
+        </a:xfrm>
+      </p:grpSpPr>
+      <p:sp>
+        <p:nvSpPr>
+          <p:cNvPr id="2" name="Title 1">
+            <a:extLst>
+              <a:ext uri="{FF2B5EF4-FFF2-40B4-BE49-F238E27FC236}">
+                <a16:creationId xmlns:a16="http://schemas.microsoft.com/office/drawing/2014/main" id="{58DA36E5-BA76-FA44-A86C-E7E14E93B80E}"/>
+              </a:ext>
+            </a:extLst>
+          </p:cNvPr>
+          <p:cNvSpPr>
+            <a:spLocks noGrp="1"/>
+          </p:cNvSpPr>
+          <p:nvPr>
+            <p:ph type="title"/>
+          </p:nvPr>
+        </p:nvSpPr>
+        <p:spPr/>
+        <p:txBody>
+          <a:bodyPr/>
+          <a:lstStyle/>
+          <a:p>
+            <a:r>
+              <a:rPr lang="en-US" dirty="0">
+                <a:highlight>
+                  <a:srgbClr val="FFFF00"/>
+                </a:highlight>
+              </a:rPr>
+              <a:t>Related Work</a:t>
+            </a:r>
+          </a:p>
+        </p:txBody>
+      </p:sp>
+      <p:pic>
+        <p:nvPicPr>
+          <p:cNvPr id="5" name="Content Placeholder 4" descr="Text&#10;&#10;Description automatically generated">
+            <a:extLst>
+              <a:ext uri="{FF2B5EF4-FFF2-40B4-BE49-F238E27FC236}">
+                <a16:creationId xmlns:a16="http://schemas.microsoft.com/office/drawing/2014/main" id="{F32220D6-3405-7845-A47C-F75A94FEFDFA}"/>
+              </a:ext>
+            </a:extLst>
+          </p:cNvPr>
+          <p:cNvPicPr>
+            <a:picLocks noGrp="1" noChangeAspect="1"/>
+          </p:cNvPicPr>
+          <p:nvPr>
+            <p:ph idx="1"/>
+          </p:nvPr>
+        </p:nvPicPr>
+        <p:blipFill>
+          <a:blip r:embed="rId2">
+            <a:extLst>
+              <a:ext uri="{28A0092B-C50C-407E-A947-70E740481C1C}">
+                <a14:useLocalDpi xmlns:a14="http://schemas.microsoft.com/office/drawing/2010/main" val="0"/>
+              </a:ext>
+            </a:extLst>
+          </a:blip>
+          <a:stretch>
+            <a:fillRect/>
+          </a:stretch>
+        </p:blipFill>
+        <p:spPr>
+          <a:xfrm>
+            <a:off x="4434712" y="1027906"/>
+            <a:ext cx="6919088" cy="2009058"/>
+          </a:xfrm>
+        </p:spPr>
+      </p:pic>
+      <p:sp>
+        <p:nvSpPr>
+          <p:cNvPr id="8" name="TextBox 7">
+            <a:extLst>
+              <a:ext uri="{FF2B5EF4-FFF2-40B4-BE49-F238E27FC236}">
+                <a16:creationId xmlns:a16="http://schemas.microsoft.com/office/drawing/2014/main" id="{04297640-152C-D142-8D22-6BBDAAF3D37B}"/>
+              </a:ext>
+            </a:extLst>
+          </p:cNvPr>
+          <p:cNvSpPr txBox="1"/>
+          <p:nvPr/>
+        </p:nvSpPr>
+        <p:spPr>
+          <a:xfrm>
+            <a:off x="267629" y="2241395"/>
+            <a:ext cx="4440399" cy="4247317"/>
+          </a:xfrm>
+          <a:prstGeom prst="rect">
+            <a:avLst/>
+          </a:prstGeom>
+          <a:noFill/>
+        </p:spPr>
+        <p:txBody>
+          <a:bodyPr wrap="square" rtlCol="0">
+            <a:spAutoFit/>
+          </a:bodyPr>
+          <a:lstStyle/>
+          <a:p>
+            <a:pPr marL="342900" indent="-342900">
+              <a:buFont typeface="+mj-lt"/>
+              <a:buAutoNum type="arabicPeriod"/>
+            </a:pPr>
+            <a:r>
+              <a:rPr lang="en-US" dirty="0"/>
+              <a:t>RQs</a:t>
+            </a:r>
+          </a:p>
+          <a:p>
+            <a:pPr marL="342900" indent="-342900">
+              <a:buFont typeface="+mj-lt"/>
+              <a:buAutoNum type="arabicPeriod"/>
+            </a:pPr>
+            <a:r>
+              <a:rPr lang="en-US" dirty="0"/>
+              <a:t>Equipment they used </a:t>
+            </a:r>
+          </a:p>
+          <a:p>
+            <a:pPr marL="342900" indent="-342900">
+              <a:buFont typeface="+mj-lt"/>
+              <a:buAutoNum type="arabicPeriod"/>
+            </a:pPr>
+            <a:r>
+              <a:rPr lang="en-US" dirty="0"/>
+              <a:t>How they used this equipment (e.g., did they use the software emotion classification provided by the sensor? Did they process the raw signal feeding their own ML model? Etc.)</a:t>
+            </a:r>
+          </a:p>
+          <a:p>
+            <a:pPr marL="342900" indent="-342900">
+              <a:buFont typeface="+mj-lt"/>
+              <a:buAutoNum type="arabicPeriod"/>
+            </a:pPr>
+            <a:r>
+              <a:rPr lang="en-US" dirty="0"/>
+              <a:t>What kinds of tasks they use in their experiments (changing code, reading code, bug fixing, peer code review, etc.)</a:t>
+            </a:r>
+          </a:p>
+          <a:p>
+            <a:pPr marL="342900" indent="-342900">
+              <a:buFont typeface="+mj-lt"/>
+              <a:buAutoNum type="arabicPeriod"/>
+            </a:pPr>
+            <a:r>
+              <a:rPr lang="en-US" dirty="0"/>
+              <a:t>What results/outcomes they've found</a:t>
+            </a:r>
+          </a:p>
+          <a:p>
+            <a:pPr marL="342900" indent="-342900">
+              <a:buFont typeface="+mj-lt"/>
+              <a:buAutoNum type="arabicPeriod"/>
+            </a:pPr>
+            <a:r>
+              <a:rPr lang="en-US" dirty="0"/>
+              <a:t>What other related works are closely related and cited in their papers (especially the most recent ones).</a:t>
+            </a:r>
+          </a:p>
+          <a:p>
+            <a:pPr marL="342900" indent="-342900">
+              <a:buFont typeface="+mj-lt"/>
+              <a:buAutoNum type="arabicPeriod"/>
+            </a:pPr>
+            <a:endParaRPr lang="en-US" dirty="0"/>
+          </a:p>
+        </p:txBody>
+      </p:sp>
+      <p:pic>
+        <p:nvPicPr>
+          <p:cNvPr id="10" name="Picture 9" descr="Graphical user interface, text&#10;&#10;Description automatically generated">
+            <a:extLst>
+              <a:ext uri="{FF2B5EF4-FFF2-40B4-BE49-F238E27FC236}">
+                <a16:creationId xmlns:a16="http://schemas.microsoft.com/office/drawing/2014/main" id="{FA5B5572-977A-8B4C-B63D-8EA8471CA9E2}"/>
+              </a:ext>
+            </a:extLst>
+          </p:cNvPr>
+          <p:cNvPicPr>
+            <a:picLocks noChangeAspect="1"/>
+          </p:cNvPicPr>
+          <p:nvPr/>
+        </p:nvPicPr>
+        <p:blipFill>
+          <a:blip r:embed="rId3">
+            <a:extLst>
+              <a:ext uri="{28A0092B-C50C-407E-A947-70E740481C1C}">
+                <a14:useLocalDpi xmlns:a14="http://schemas.microsoft.com/office/drawing/2010/main" val="0"/>
+              </a:ext>
+            </a:extLst>
+          </a:blip>
+          <a:stretch>
+            <a:fillRect/>
+          </a:stretch>
+        </p:blipFill>
+        <p:spPr>
+          <a:xfrm>
+            <a:off x="5033892" y="3233543"/>
+            <a:ext cx="6434406" cy="1743838"/>
+          </a:xfrm>
+          <a:prstGeom prst="rect">
+            <a:avLst/>
+          </a:prstGeom>
+        </p:spPr>
+      </p:pic>
+      <p:sp>
+        <p:nvSpPr>
+          <p:cNvPr id="11" name="TextBox 10">
+            <a:extLst>
+              <a:ext uri="{FF2B5EF4-FFF2-40B4-BE49-F238E27FC236}">
+                <a16:creationId xmlns:a16="http://schemas.microsoft.com/office/drawing/2014/main" id="{40BE589A-6BF0-6045-A0F3-A25A253CB56C}"/>
+              </a:ext>
+            </a:extLst>
+          </p:cNvPr>
+          <p:cNvSpPr txBox="1"/>
+          <p:nvPr/>
+        </p:nvSpPr>
+        <p:spPr>
+          <a:xfrm>
+            <a:off x="5787483" y="758284"/>
+            <a:ext cx="4468852" cy="369332"/>
+          </a:xfrm>
+          <a:prstGeom prst="rect">
+            <a:avLst/>
+          </a:prstGeom>
+          <a:noFill/>
+        </p:spPr>
+        <p:txBody>
+          <a:bodyPr wrap="none" rtlCol="0">
+            <a:spAutoFit/>
+          </a:bodyPr>
+          <a:lstStyle/>
+          <a:p>
+            <a:r>
+              <a:rPr lang="en-US" dirty="0"/>
+              <a:t>ICSE 2020 Technical Paper (Artifacts available)</a:t>
+            </a:r>
+          </a:p>
+        </p:txBody>
+      </p:sp>
+      <p:sp>
+        <p:nvSpPr>
+          <p:cNvPr id="12" name="TextBox 11">
+            <a:extLst>
+              <a:ext uri="{FF2B5EF4-FFF2-40B4-BE49-F238E27FC236}">
+                <a16:creationId xmlns:a16="http://schemas.microsoft.com/office/drawing/2014/main" id="{8C5841EC-0AE5-B145-A4C1-328DE85CBD95}"/>
+              </a:ext>
+            </a:extLst>
+          </p:cNvPr>
+          <p:cNvSpPr txBox="1"/>
+          <p:nvPr/>
+        </p:nvSpPr>
+        <p:spPr>
+          <a:xfrm>
+            <a:off x="6745640" y="3121920"/>
+            <a:ext cx="2818207" cy="369332"/>
+          </a:xfrm>
+          <a:prstGeom prst="rect">
+            <a:avLst/>
+          </a:prstGeom>
+          <a:noFill/>
+        </p:spPr>
+        <p:txBody>
+          <a:bodyPr wrap="none" rtlCol="0">
+            <a:spAutoFit/>
+          </a:bodyPr>
+          <a:lstStyle/>
+          <a:p>
+            <a:r>
+              <a:rPr lang="en-US" dirty="0"/>
+              <a:t>ICPC 2019 Replication Paper</a:t>
+            </a:r>
+          </a:p>
+        </p:txBody>
+      </p:sp>
+      <p:pic>
+        <p:nvPicPr>
+          <p:cNvPr id="15" name="Picture 14" descr="Text&#10;&#10;Description automatically generated">
+            <a:extLst>
+              <a:ext uri="{FF2B5EF4-FFF2-40B4-BE49-F238E27FC236}">
+                <a16:creationId xmlns:a16="http://schemas.microsoft.com/office/drawing/2014/main" id="{2F6D056B-BAFA-D540-B1B2-6D35566A72FF}"/>
+              </a:ext>
+            </a:extLst>
+          </p:cNvPr>
+          <p:cNvPicPr>
+            <a:picLocks noChangeAspect="1"/>
+          </p:cNvPicPr>
+          <p:nvPr/>
+        </p:nvPicPr>
+        <p:blipFill>
+          <a:blip r:embed="rId4">
+            <a:extLst>
+              <a:ext uri="{28A0092B-C50C-407E-A947-70E740481C1C}">
+                <a14:useLocalDpi xmlns:a14="http://schemas.microsoft.com/office/drawing/2010/main" val="0"/>
+              </a:ext>
+            </a:extLst>
+          </a:blip>
+          <a:stretch>
+            <a:fillRect/>
+          </a:stretch>
+        </p:blipFill>
+        <p:spPr>
+          <a:xfrm>
+            <a:off x="5124295" y="5184801"/>
+            <a:ext cx="6229505" cy="1488746"/>
+          </a:xfrm>
+          <a:prstGeom prst="rect">
+            <a:avLst/>
+          </a:prstGeom>
+        </p:spPr>
+      </p:pic>
+      <p:sp>
+        <p:nvSpPr>
+          <p:cNvPr id="16" name="TextBox 15">
+            <a:extLst>
+              <a:ext uri="{FF2B5EF4-FFF2-40B4-BE49-F238E27FC236}">
+                <a16:creationId xmlns:a16="http://schemas.microsoft.com/office/drawing/2014/main" id="{4039F49C-A56C-0E40-A5AA-4675C139EA49}"/>
+              </a:ext>
+            </a:extLst>
+          </p:cNvPr>
+          <p:cNvSpPr txBox="1"/>
+          <p:nvPr/>
+        </p:nvSpPr>
+        <p:spPr>
+          <a:xfrm>
+            <a:off x="7483973" y="5034107"/>
+            <a:ext cx="1075872" cy="369332"/>
+          </a:xfrm>
+          <a:prstGeom prst="rect">
+            <a:avLst/>
+          </a:prstGeom>
+          <a:noFill/>
+        </p:spPr>
+        <p:txBody>
+          <a:bodyPr wrap="none" rtlCol="0">
+            <a:spAutoFit/>
+          </a:bodyPr>
+          <a:lstStyle/>
+          <a:p>
+            <a:r>
+              <a:rPr lang="en-US" dirty="0"/>
+              <a:t>ACII 2017</a:t>
+            </a:r>
+          </a:p>
+        </p:txBody>
+      </p:sp>
+      <p:sp>
+        <p:nvSpPr>
+          <p:cNvPr id="17" name="Rectangle 16">
+            <a:extLst>
+              <a:ext uri="{FF2B5EF4-FFF2-40B4-BE49-F238E27FC236}">
+                <a16:creationId xmlns:a16="http://schemas.microsoft.com/office/drawing/2014/main" id="{98235A30-03F6-C348-B6C9-88C981A17413}"/>
+              </a:ext>
+            </a:extLst>
+          </p:cNvPr>
+          <p:cNvSpPr/>
+          <p:nvPr/>
+        </p:nvSpPr>
+        <p:spPr>
+          <a:xfrm>
+            <a:off x="0" y="6488668"/>
+            <a:ext cx="9467385" cy="369332"/>
+          </a:xfrm>
+          <a:prstGeom prst="rect">
+            <a:avLst/>
+          </a:prstGeom>
+        </p:spPr>
+        <p:txBody>
+          <a:bodyPr wrap="square">
+            <a:spAutoFit/>
+          </a:bodyPr>
+          <a:lstStyle/>
+          <a:p>
+            <a:r>
+              <a:rPr lang="en-US" dirty="0"/>
+              <a:t>Also this one https://</a:t>
+            </a:r>
+            <a:r>
+              <a:rPr lang="en-US" dirty="0" err="1"/>
+              <a:t>web.eecs.umich.edu</a:t>
+            </a:r>
+            <a:r>
+              <a:rPr lang="en-US" dirty="0"/>
+              <a:t>/~</a:t>
+            </a:r>
+            <a:r>
+              <a:rPr lang="en-US" dirty="0" err="1"/>
+              <a:t>weimerw</a:t>
+            </a:r>
+            <a:r>
+              <a:rPr lang="en-US" dirty="0"/>
+              <a:t>/p/weimer-fse2020-bias.pdf</a:t>
+            </a:r>
+          </a:p>
+        </p:txBody>
+      </p:sp>
+    </p:spTree>
+    <p:extLst>
+      <p:ext uri="{BB962C8B-B14F-4D97-AF65-F5344CB8AC3E}">
+        <p14:creationId xmlns:p14="http://schemas.microsoft.com/office/powerpoint/2010/main" val="456771731"/>
       </p:ext>
     </p:extLst>
   </p:cSld>

</xml_diff>

<commit_message>
Comments made on the research questions section
</commit_message>
<xml_diff>
--- a/Thesis Idea.pptx
+++ b/Thesis Idea.pptx
@@ -272,7 +272,7 @@
           <a:p>
             <a:fld id="{00284868-4315-4427-9D14-6A5CD0C97C48}" type="datetimeFigureOut">
               <a:rPr lang="en-US" smtClean="0"/>
-              <a:t>11/13/2020</a:t>
+              <a:t>11/13/20</a:t>
             </a:fld>
             <a:endParaRPr lang="en-US"/>
           </a:p>
@@ -470,7 +470,7 @@
           <a:p>
             <a:fld id="{00284868-4315-4427-9D14-6A5CD0C97C48}" type="datetimeFigureOut">
               <a:rPr lang="en-US" smtClean="0"/>
-              <a:t>11/13/2020</a:t>
+              <a:t>11/13/20</a:t>
             </a:fld>
             <a:endParaRPr lang="en-US"/>
           </a:p>
@@ -678,7 +678,7 @@
           <a:p>
             <a:fld id="{00284868-4315-4427-9D14-6A5CD0C97C48}" type="datetimeFigureOut">
               <a:rPr lang="en-US" smtClean="0"/>
-              <a:t>11/13/2020</a:t>
+              <a:t>11/13/20</a:t>
             </a:fld>
             <a:endParaRPr lang="en-US"/>
           </a:p>
@@ -876,7 +876,7 @@
           <a:p>
             <a:fld id="{00284868-4315-4427-9D14-6A5CD0C97C48}" type="datetimeFigureOut">
               <a:rPr lang="en-US" smtClean="0"/>
-              <a:t>11/13/2020</a:t>
+              <a:t>11/13/20</a:t>
             </a:fld>
             <a:endParaRPr lang="en-US"/>
           </a:p>
@@ -1151,7 +1151,7 @@
           <a:p>
             <a:fld id="{00284868-4315-4427-9D14-6A5CD0C97C48}" type="datetimeFigureOut">
               <a:rPr lang="en-US" smtClean="0"/>
-              <a:t>11/13/2020</a:t>
+              <a:t>11/13/20</a:t>
             </a:fld>
             <a:endParaRPr lang="en-US"/>
           </a:p>
@@ -1416,7 +1416,7 @@
           <a:p>
             <a:fld id="{00284868-4315-4427-9D14-6A5CD0C97C48}" type="datetimeFigureOut">
               <a:rPr lang="en-US" smtClean="0"/>
-              <a:t>11/13/2020</a:t>
+              <a:t>11/13/20</a:t>
             </a:fld>
             <a:endParaRPr lang="en-US"/>
           </a:p>
@@ -1828,7 +1828,7 @@
           <a:p>
             <a:fld id="{00284868-4315-4427-9D14-6A5CD0C97C48}" type="datetimeFigureOut">
               <a:rPr lang="en-US" smtClean="0"/>
-              <a:t>11/13/2020</a:t>
+              <a:t>11/13/20</a:t>
             </a:fld>
             <a:endParaRPr lang="en-US"/>
           </a:p>
@@ -1969,7 +1969,7 @@
           <a:p>
             <a:fld id="{00284868-4315-4427-9D14-6A5CD0C97C48}" type="datetimeFigureOut">
               <a:rPr lang="en-US" smtClean="0"/>
-              <a:t>11/13/2020</a:t>
+              <a:t>11/13/20</a:t>
             </a:fld>
             <a:endParaRPr lang="en-US"/>
           </a:p>
@@ -2082,7 +2082,7 @@
           <a:p>
             <a:fld id="{00284868-4315-4427-9D14-6A5CD0C97C48}" type="datetimeFigureOut">
               <a:rPr lang="en-US" smtClean="0"/>
-              <a:t>11/13/2020</a:t>
+              <a:t>11/13/20</a:t>
             </a:fld>
             <a:endParaRPr lang="en-US"/>
           </a:p>
@@ -2393,7 +2393,7 @@
           <a:p>
             <a:fld id="{00284868-4315-4427-9D14-6A5CD0C97C48}" type="datetimeFigureOut">
               <a:rPr lang="en-US" smtClean="0"/>
-              <a:t>11/13/2020</a:t>
+              <a:t>11/13/20</a:t>
             </a:fld>
             <a:endParaRPr lang="en-US"/>
           </a:p>
@@ -2681,7 +2681,7 @@
           <a:p>
             <a:fld id="{00284868-4315-4427-9D14-6A5CD0C97C48}" type="datetimeFigureOut">
               <a:rPr lang="en-US" smtClean="0"/>
-              <a:t>11/13/2020</a:t>
+              <a:t>11/13/20</a:t>
             </a:fld>
             <a:endParaRPr lang="en-US"/>
           </a:p>
@@ -2922,7 +2922,7 @@
           <a:p>
             <a:fld id="{00284868-4315-4427-9D14-6A5CD0C97C48}" type="datetimeFigureOut">
               <a:rPr lang="en-US" smtClean="0"/>
-              <a:t>11/13/2020</a:t>
+              <a:t>11/13/20</a:t>
             </a:fld>
             <a:endParaRPr lang="en-US"/>
           </a:p>
@@ -4260,13 +4260,8 @@
             </a:pPr>
             <a:r>
               <a:rPr lang="en-US" dirty="0"/>
-              <a:t>Read code answer questions with different parts of the code altered to make it harder or easier to read. Some parts of code were added that were deemed rare to add surprisal. Had one control group and one working on the altered code but </a:t>
-            </a:r>
-            <a:r>
-              <a:rPr lang="en-US"/>
-              <a:t>not swapped.</a:t>
-            </a:r>
-            <a:endParaRPr lang="en-US" dirty="0"/>
+              <a:t>Read code answer questions with different parts of the code altered to make it harder or easier to read. Some parts of code were added that were deemed rare to add surprisal. Had one control group and one working on the altered code but not swapped.</a:t>
+            </a:r>
           </a:p>
           <a:p>
             <a:pPr marL="342900" indent="-342900">
@@ -4394,12 +4389,12 @@
           <a:lstStyle/>
           <a:p>
             <a:r>
-              <a:rPr lang="en-US">
+              <a:rPr lang="en-US" dirty="0">
                 <a:hlinkClick r:id="rId2"/>
               </a:rPr>
               <a:t>https://dl.acm.org/doi/abs/10.1145/3334480.3381446</a:t>
             </a:r>
-            <a:endParaRPr lang="en-US"/>
+            <a:endParaRPr lang="en-US" dirty="0"/>
           </a:p>
         </p:txBody>
       </p:sp>
@@ -4455,48 +4450,44 @@
           <a:lstStyle/>
           <a:p>
             <a:r>
-              <a:rPr lang="en-US" dirty="0">
+              <a:rPr lang="en-US" dirty="0"/>
+              <a:t>Context (Laying out the problem)</a:t>
+            </a:r>
+          </a:p>
+        </p:txBody>
+      </p:sp>
+      <p:sp>
+        <p:nvSpPr>
+          <p:cNvPr id="3" name="Content Placeholder 2">
+            <a:extLst>
+              <a:ext uri="{FF2B5EF4-FFF2-40B4-BE49-F238E27FC236}">
+                <a16:creationId xmlns:a16="http://schemas.microsoft.com/office/drawing/2014/main" id="{B8898F6A-3124-5A47-95A6-28BEC14098BE}"/>
+              </a:ext>
+            </a:extLst>
+          </p:cNvPr>
+          <p:cNvSpPr>
+            <a:spLocks noGrp="1"/>
+          </p:cNvSpPr>
+          <p:nvPr>
+            <p:ph idx="1"/>
+          </p:nvPr>
+        </p:nvSpPr>
+        <p:spPr/>
+        <p:txBody>
+          <a:bodyPr/>
+          <a:lstStyle/>
+          <a:p>
+            <a:r>
+              <a:rPr lang="en-US" dirty="0"/>
+              <a:t>Many papers have been published about how engineers approach problem solving and ideas differently than other non engineering individuals. This engineering mindset is said to be a more problem orientated approach and analytical than the typical persons thought pattern. But does this shift in thinking actually result in a readable process in the brain? </a:t>
+            </a:r>
+            <a:r>
+              <a:rPr lang="en-US" i="1" dirty="0">
                 <a:highlight>
                   <a:srgbClr val="FFFF00"/>
                 </a:highlight>
               </a:rPr>
-              <a:t>Context (Laying out the problem)</a:t>
-            </a:r>
-          </a:p>
-        </p:txBody>
-      </p:sp>
-      <p:sp>
-        <p:nvSpPr>
-          <p:cNvPr id="3" name="Content Placeholder 2">
-            <a:extLst>
-              <a:ext uri="{FF2B5EF4-FFF2-40B4-BE49-F238E27FC236}">
-                <a16:creationId xmlns:a16="http://schemas.microsoft.com/office/drawing/2014/main" id="{B8898F6A-3124-5A47-95A6-28BEC14098BE}"/>
-              </a:ext>
-            </a:extLst>
-          </p:cNvPr>
-          <p:cNvSpPr>
-            <a:spLocks noGrp="1"/>
-          </p:cNvSpPr>
-          <p:nvPr>
-            <p:ph idx="1"/>
-          </p:nvPr>
-        </p:nvSpPr>
-        <p:spPr/>
-        <p:txBody>
-          <a:bodyPr/>
-          <a:lstStyle/>
-          <a:p>
-            <a:r>
-              <a:rPr lang="en-US" dirty="0"/>
-              <a:t>Many papers have been published about how engineers approach problem solving and ideas differently than other non engineering individuals. This engineering mindset is said to be a more problem orientated approach and </a:t>
-            </a:r>
-            <a:r>
-              <a:rPr lang="en-US" dirty="0" err="1"/>
-              <a:t>anylitical</a:t>
-            </a:r>
-            <a:r>
-              <a:rPr lang="en-US" dirty="0"/>
-              <a:t> than the typical persons thought patter. But does this shift in thinking actually result in a readable process in the brain?</a:t>
+              <a:t>[My concern is that maybe this question is already answered. That’s the risk of tapping another field (brain science). We need to look at the literature to make sure we’re not reinventing the wheel or trying to answer something that’s already answered.]</a:t>
             </a:r>
           </a:p>
         </p:txBody>
@@ -4663,7 +4654,9 @@
         </p:nvSpPr>
         <p:spPr/>
         <p:txBody>
-          <a:bodyPr/>
+          <a:bodyPr>
+            <a:normAutofit fontScale="62500" lnSpcReduction="20000"/>
+          </a:bodyPr>
           <a:lstStyle/>
           <a:p>
             <a:pPr lvl="1"/>
@@ -4689,6 +4682,10 @@
             </a:r>
           </a:p>
           <a:p>
+            <a:pPr lvl="2"/>
+            <a:endParaRPr lang="en-US" dirty="0"/>
+          </a:p>
+          <a:p>
             <a:pPr lvl="1"/>
             <a:r>
               <a:rPr lang="en-US" dirty="0"/>
@@ -4701,6 +4698,129 @@
             <a:r>
               <a:rPr lang="en-US" dirty="0"/>
               <a:t> data?</a:t>
+            </a:r>
+          </a:p>
+          <a:p>
+            <a:pPr marL="457200" lvl="1" indent="0">
+              <a:buNone/>
+            </a:pPr>
+            <a:r>
+              <a:rPr lang="en-US" i="1" dirty="0">
+                <a:highlight>
+                  <a:srgbClr val="FFFF00"/>
+                </a:highlight>
+              </a:rPr>
+              <a:t>Doesn’t the ICPC’19 paper (in the related work section) answer this question (or a similar question)? “Can we relate expertise to classification accuracy?”</a:t>
+            </a:r>
+          </a:p>
+          <a:p>
+            <a:pPr marL="457200" lvl="1" indent="0">
+              <a:buNone/>
+            </a:pPr>
+            <a:endParaRPr lang="en-US" i="1" dirty="0">
+              <a:highlight>
+                <a:srgbClr val="FFFF00"/>
+              </a:highlight>
+            </a:endParaRPr>
+          </a:p>
+          <a:p>
+            <a:pPr marL="457200" lvl="1" indent="0">
+              <a:buNone/>
+            </a:pPr>
+            <a:r>
+              <a:rPr lang="en-US" i="1" dirty="0">
+                <a:highlight>
+                  <a:srgbClr val="FFFF00"/>
+                </a:highlight>
+              </a:rPr>
+              <a:t>Some more specific questions:</a:t>
+            </a:r>
+          </a:p>
+          <a:p>
+            <a:pPr marL="457200" lvl="1" indent="0">
+              <a:buNone/>
+            </a:pPr>
+            <a:r>
+              <a:rPr lang="en-US" i="1" dirty="0">
+                <a:highlight>
+                  <a:srgbClr val="FFFF00"/>
+                </a:highlight>
+              </a:rPr>
+              <a:t>They’re more specific on the context of the tasks the developers are asked to perform and on the context of what metrics we’re applying.</a:t>
+            </a:r>
+          </a:p>
+          <a:p>
+            <a:pPr lvl="1"/>
+            <a:r>
+              <a:rPr lang="en-US" i="1" dirty="0">
+                <a:highlight>
+                  <a:srgbClr val="FFFF00"/>
+                </a:highlight>
+              </a:rPr>
+              <a:t>How and to what extent developers’ brain performance vary while coding with and without listening to music? </a:t>
+            </a:r>
+          </a:p>
+          <a:p>
+            <a:pPr lvl="1"/>
+            <a:r>
+              <a:rPr lang="en-US" i="1" dirty="0">
+                <a:highlight>
+                  <a:srgbClr val="FFFF00"/>
+                </a:highlight>
+              </a:rPr>
+              <a:t>How and to what extent developers’ brain performance vary while maintaining code with different quality[or complexity or style or …]? </a:t>
+            </a:r>
+          </a:p>
+          <a:p>
+            <a:pPr lvl="1"/>
+            <a:r>
+              <a:rPr lang="en-US" i="1" dirty="0">
+                <a:highlight>
+                  <a:srgbClr val="FFFF00"/>
+                </a:highlight>
+              </a:rPr>
+              <a:t>Do developers feel less stressed and more engaged and focused while coding listening to music?</a:t>
+            </a:r>
+          </a:p>
+          <a:p>
+            <a:pPr lvl="1"/>
+            <a:r>
+              <a:rPr lang="en-US" i="1" dirty="0">
+                <a:highlight>
+                  <a:srgbClr val="FFFF00"/>
+                </a:highlight>
+              </a:rPr>
+              <a:t>Do developers feel more stressed and less engaged while reading code with ‘one-liners abuse’ [or coding not following standard style guidelines]?</a:t>
+            </a:r>
+          </a:p>
+          <a:p>
+            <a:pPr lvl="1"/>
+            <a:r>
+              <a:rPr lang="en-US" i="1" dirty="0">
+                <a:highlight>
+                  <a:srgbClr val="FFFF00"/>
+                </a:highlight>
+              </a:rPr>
+              <a:t>[Or a questions for a replication study] </a:t>
+            </a:r>
+            <a:r>
+              <a:rPr lang="en-US" dirty="0">
+                <a:highlight>
+                  <a:srgbClr val="FFFF00"/>
+                </a:highlight>
+              </a:rPr>
+              <a:t>How does surprisal in source code influence developers’ brain?</a:t>
+            </a:r>
+          </a:p>
+          <a:p>
+            <a:pPr lvl="2"/>
+            <a:r>
+              <a:rPr lang="en-US" i="1" dirty="0">
+                <a:highlight>
+                  <a:srgbClr val="FFFF00"/>
+                </a:highlight>
+              </a:rPr>
+              <a:t>As a replication study, we would use the same questions, code snippets, etc. However, measuring brain signal and brain performance metrics, rather than accuracy and correctness (the metrics they measured in their RQs. We can measure them as well for comparison reasons, but we’d be looking at different outcomes)</a:t>
             </a:r>
           </a:p>
         </p:txBody>
@@ -5321,41 +5441,6 @@
             <a:r>
               <a:rPr lang="en-US" dirty="0"/>
               <a:t>ICPC 2019 Replication Paper</a:t>
-            </a:r>
-          </a:p>
-        </p:txBody>
-      </p:sp>
-      <p:sp>
-        <p:nvSpPr>
-          <p:cNvPr id="16" name="TextBox 15">
-            <a:extLst>
-              <a:ext uri="{FF2B5EF4-FFF2-40B4-BE49-F238E27FC236}">
-                <a16:creationId xmlns:a16="http://schemas.microsoft.com/office/drawing/2014/main" id="{4039F49C-A56C-0E40-A5AA-4675C139EA49}"/>
-              </a:ext>
-            </a:extLst>
-          </p:cNvPr>
-          <p:cNvSpPr txBox="1"/>
-          <p:nvPr/>
-        </p:nvSpPr>
-        <p:spPr>
-          <a:xfrm>
-            <a:off x="7483973" y="5034107"/>
-            <a:ext cx="1075872" cy="369332"/>
-          </a:xfrm>
-          <a:prstGeom prst="rect">
-            <a:avLst/>
-          </a:prstGeom>
-          <a:noFill/>
-        </p:spPr>
-        <p:txBody>
-          <a:bodyPr wrap="none" rtlCol="0">
-            <a:spAutoFit/>
-          </a:bodyPr>
-          <a:lstStyle/>
-          <a:p>
-            <a:r>
-              <a:rPr lang="en-US" dirty="0"/>
-              <a:t>ACII 2017</a:t>
             </a:r>
           </a:p>
         </p:txBody>

</xml_diff>

<commit_message>
added paper and differenting questions
</commit_message>
<xml_diff>
--- a/Thesis Idea.pptx
+++ b/Thesis Idea.pptx
@@ -18,7 +18,9 @@
     <p:sldId id="269" r:id="rId12"/>
     <p:sldId id="270" r:id="rId13"/>
     <p:sldId id="268" r:id="rId14"/>
-    <p:sldId id="267" r:id="rId15"/>
+    <p:sldId id="271" r:id="rId15"/>
+    <p:sldId id="272" r:id="rId16"/>
+    <p:sldId id="267" r:id="rId17"/>
   </p:sldIdLst>
   <p:sldSz cx="12192000" cy="6858000"/>
   <p:notesSz cx="6858000" cy="9144000"/>
@@ -272,7 +274,7 @@
           <a:p>
             <a:fld id="{00284868-4315-4427-9D14-6A5CD0C97C48}" type="datetimeFigureOut">
               <a:rPr lang="en-US" smtClean="0"/>
-              <a:t>11/13/20</a:t>
+              <a:t>11/17/2020</a:t>
             </a:fld>
             <a:endParaRPr lang="en-US"/>
           </a:p>
@@ -470,7 +472,7 @@
           <a:p>
             <a:fld id="{00284868-4315-4427-9D14-6A5CD0C97C48}" type="datetimeFigureOut">
               <a:rPr lang="en-US" smtClean="0"/>
-              <a:t>11/13/20</a:t>
+              <a:t>11/17/2020</a:t>
             </a:fld>
             <a:endParaRPr lang="en-US"/>
           </a:p>
@@ -678,7 +680,7 @@
           <a:p>
             <a:fld id="{00284868-4315-4427-9D14-6A5CD0C97C48}" type="datetimeFigureOut">
               <a:rPr lang="en-US" smtClean="0"/>
-              <a:t>11/13/20</a:t>
+              <a:t>11/17/2020</a:t>
             </a:fld>
             <a:endParaRPr lang="en-US"/>
           </a:p>
@@ -876,7 +878,7 @@
           <a:p>
             <a:fld id="{00284868-4315-4427-9D14-6A5CD0C97C48}" type="datetimeFigureOut">
               <a:rPr lang="en-US" smtClean="0"/>
-              <a:t>11/13/20</a:t>
+              <a:t>11/17/2020</a:t>
             </a:fld>
             <a:endParaRPr lang="en-US"/>
           </a:p>
@@ -1151,7 +1153,7 @@
           <a:p>
             <a:fld id="{00284868-4315-4427-9D14-6A5CD0C97C48}" type="datetimeFigureOut">
               <a:rPr lang="en-US" smtClean="0"/>
-              <a:t>11/13/20</a:t>
+              <a:t>11/17/2020</a:t>
             </a:fld>
             <a:endParaRPr lang="en-US"/>
           </a:p>
@@ -1416,7 +1418,7 @@
           <a:p>
             <a:fld id="{00284868-4315-4427-9D14-6A5CD0C97C48}" type="datetimeFigureOut">
               <a:rPr lang="en-US" smtClean="0"/>
-              <a:t>11/13/20</a:t>
+              <a:t>11/17/2020</a:t>
             </a:fld>
             <a:endParaRPr lang="en-US"/>
           </a:p>
@@ -1828,7 +1830,7 @@
           <a:p>
             <a:fld id="{00284868-4315-4427-9D14-6A5CD0C97C48}" type="datetimeFigureOut">
               <a:rPr lang="en-US" smtClean="0"/>
-              <a:t>11/13/20</a:t>
+              <a:t>11/17/2020</a:t>
             </a:fld>
             <a:endParaRPr lang="en-US"/>
           </a:p>
@@ -1969,7 +1971,7 @@
           <a:p>
             <a:fld id="{00284868-4315-4427-9D14-6A5CD0C97C48}" type="datetimeFigureOut">
               <a:rPr lang="en-US" smtClean="0"/>
-              <a:t>11/13/20</a:t>
+              <a:t>11/17/2020</a:t>
             </a:fld>
             <a:endParaRPr lang="en-US"/>
           </a:p>
@@ -2082,7 +2084,7 @@
           <a:p>
             <a:fld id="{00284868-4315-4427-9D14-6A5CD0C97C48}" type="datetimeFigureOut">
               <a:rPr lang="en-US" smtClean="0"/>
-              <a:t>11/13/20</a:t>
+              <a:t>11/17/2020</a:t>
             </a:fld>
             <a:endParaRPr lang="en-US"/>
           </a:p>
@@ -2393,7 +2395,7 @@
           <a:p>
             <a:fld id="{00284868-4315-4427-9D14-6A5CD0C97C48}" type="datetimeFigureOut">
               <a:rPr lang="en-US" smtClean="0"/>
-              <a:t>11/13/20</a:t>
+              <a:t>11/17/2020</a:t>
             </a:fld>
             <a:endParaRPr lang="en-US"/>
           </a:p>
@@ -2681,7 +2683,7 @@
           <a:p>
             <a:fld id="{00284868-4315-4427-9D14-6A5CD0C97C48}" type="datetimeFigureOut">
               <a:rPr lang="en-US" smtClean="0"/>
-              <a:t>11/13/20</a:t>
+              <a:t>11/17/2020</a:t>
             </a:fld>
             <a:endParaRPr lang="en-US"/>
           </a:p>
@@ -2922,7 +2924,7 @@
           <a:p>
             <a:fld id="{00284868-4315-4427-9D14-6A5CD0C97C48}" type="datetimeFigureOut">
               <a:rPr lang="en-US" smtClean="0"/>
-              <a:t>11/13/20</a:t>
+              <a:t>11/17/2020</a:t>
             </a:fld>
             <a:endParaRPr lang="en-US"/>
           </a:p>
@@ -4347,6 +4349,376 @@
           <p:cNvPr id="2" name="Title 1">
             <a:extLst>
               <a:ext uri="{FF2B5EF4-FFF2-40B4-BE49-F238E27FC236}">
+                <a16:creationId xmlns:a16="http://schemas.microsoft.com/office/drawing/2014/main" id="{58DA36E5-BA76-FA44-A86C-E7E14E93B80E}"/>
+              </a:ext>
+            </a:extLst>
+          </p:cNvPr>
+          <p:cNvSpPr>
+            <a:spLocks noGrp="1"/>
+          </p:cNvSpPr>
+          <p:nvPr>
+            <p:ph type="title"/>
+          </p:nvPr>
+        </p:nvSpPr>
+        <p:spPr/>
+        <p:txBody>
+          <a:bodyPr/>
+          <a:lstStyle/>
+          <a:p>
+            <a:r>
+              <a:rPr lang="en-US" dirty="0">
+                <a:highlight>
+                  <a:srgbClr val="FFFF00"/>
+                </a:highlight>
+              </a:rPr>
+              <a:t>Related Work</a:t>
+            </a:r>
+          </a:p>
+        </p:txBody>
+      </p:sp>
+      <p:sp>
+        <p:nvSpPr>
+          <p:cNvPr id="8" name="TextBox 7">
+            <a:extLst>
+              <a:ext uri="{FF2B5EF4-FFF2-40B4-BE49-F238E27FC236}">
+                <a16:creationId xmlns:a16="http://schemas.microsoft.com/office/drawing/2014/main" id="{04297640-152C-D142-8D22-6BBDAAF3D37B}"/>
+              </a:ext>
+            </a:extLst>
+          </p:cNvPr>
+          <p:cNvSpPr txBox="1"/>
+          <p:nvPr/>
+        </p:nvSpPr>
+        <p:spPr>
+          <a:xfrm>
+            <a:off x="267629" y="2241395"/>
+            <a:ext cx="4440399" cy="3139321"/>
+          </a:xfrm>
+          <a:prstGeom prst="rect">
+            <a:avLst/>
+          </a:prstGeom>
+          <a:noFill/>
+        </p:spPr>
+        <p:txBody>
+          <a:bodyPr wrap="square" rtlCol="0">
+            <a:spAutoFit/>
+          </a:bodyPr>
+          <a:lstStyle/>
+          <a:p>
+            <a:pPr marL="342900" indent="-342900">
+              <a:buFont typeface="+mj-lt"/>
+              <a:buAutoNum type="arabicPeriod"/>
+            </a:pPr>
+            <a:r>
+              <a:rPr lang="en-US" dirty="0"/>
+              <a:t>How does the level of noise low vs high impact creativity and cognitive function</a:t>
+            </a:r>
+          </a:p>
+          <a:p>
+            <a:pPr marL="342900" indent="-342900">
+              <a:buFont typeface="+mj-lt"/>
+              <a:buAutoNum type="arabicPeriod"/>
+            </a:pPr>
+            <a:r>
+              <a:rPr lang="en-US" dirty="0"/>
+              <a:t>RAT, user feedback</a:t>
+            </a:r>
+          </a:p>
+          <a:p>
+            <a:pPr marL="342900" indent="-342900">
+              <a:buFont typeface="+mj-lt"/>
+              <a:buAutoNum type="arabicPeriod"/>
+            </a:pPr>
+            <a:r>
+              <a:rPr lang="en-US" dirty="0"/>
+              <a:t>Multiple </a:t>
+            </a:r>
+            <a:r>
+              <a:rPr lang="en-US" dirty="0" err="1"/>
+              <a:t>experements</a:t>
+            </a:r>
+            <a:r>
+              <a:rPr lang="en-US" dirty="0"/>
+              <a:t> testing user interaction and gathering data manually from users</a:t>
+            </a:r>
+          </a:p>
+          <a:p>
+            <a:pPr marL="342900" indent="-342900">
+              <a:buFont typeface="+mj-lt"/>
+              <a:buAutoNum type="arabicPeriod"/>
+            </a:pPr>
+            <a:r>
+              <a:rPr lang="en-US" dirty="0"/>
+              <a:t>Most were computer based tasks but varied in some way to narrow down bias </a:t>
+            </a:r>
+          </a:p>
+          <a:p>
+            <a:pPr marL="342900" indent="-342900">
+              <a:buFont typeface="+mj-lt"/>
+              <a:buAutoNum type="arabicPeriod"/>
+            </a:pPr>
+            <a:r>
+              <a:rPr lang="en-US" dirty="0"/>
+              <a:t>They find that there is an upside down u shaped correlation with noise level and creative cognition</a:t>
+            </a:r>
+          </a:p>
+        </p:txBody>
+      </p:sp>
+      <p:pic>
+        <p:nvPicPr>
+          <p:cNvPr id="5" name="Picture 4" descr="Text&#10;&#10;Description automatically generated">
+            <a:extLst>
+              <a:ext uri="{FF2B5EF4-FFF2-40B4-BE49-F238E27FC236}">
+                <a16:creationId xmlns:a16="http://schemas.microsoft.com/office/drawing/2014/main" id="{D07E82E0-F503-474E-A7CC-4A7444BD6E67}"/>
+              </a:ext>
+            </a:extLst>
+          </p:cNvPr>
+          <p:cNvPicPr>
+            <a:picLocks noChangeAspect="1"/>
+          </p:cNvPicPr>
+          <p:nvPr/>
+        </p:nvPicPr>
+        <p:blipFill>
+          <a:blip r:embed="rId2">
+            <a:extLst>
+              <a:ext uri="{28A0092B-C50C-407E-A947-70E740481C1C}">
+                <a14:useLocalDpi xmlns:a14="http://schemas.microsoft.com/office/drawing/2010/main" val="0"/>
+              </a:ext>
+            </a:extLst>
+          </a:blip>
+          <a:stretch>
+            <a:fillRect/>
+          </a:stretch>
+        </p:blipFill>
+        <p:spPr>
+          <a:xfrm>
+            <a:off x="5353926" y="481778"/>
+            <a:ext cx="5689892" cy="1092256"/>
+          </a:xfrm>
+          <a:prstGeom prst="rect">
+            <a:avLst/>
+          </a:prstGeom>
+        </p:spPr>
+      </p:pic>
+    </p:spTree>
+    <p:extLst>
+      <p:ext uri="{BB962C8B-B14F-4D97-AF65-F5344CB8AC3E}">
+        <p14:creationId xmlns:p14="http://schemas.microsoft.com/office/powerpoint/2010/main" val="1222395887"/>
+      </p:ext>
+    </p:extLst>
+  </p:cSld>
+  <p:clrMapOvr>
+    <a:masterClrMapping/>
+  </p:clrMapOvr>
+</p:sld>
+</file>
+
+<file path=ppt/slides/slide15.xml><?xml version="1.0" encoding="utf-8"?>
+<p:sld xmlns:a="http://schemas.openxmlformats.org/drawingml/2006/main" xmlns:r="http://schemas.openxmlformats.org/officeDocument/2006/relationships" xmlns:p="http://schemas.openxmlformats.org/presentationml/2006/main">
+  <p:cSld>
+    <p:spTree>
+      <p:nvGrpSpPr>
+        <p:cNvPr id="1" name=""/>
+        <p:cNvGrpSpPr/>
+        <p:nvPr/>
+      </p:nvGrpSpPr>
+      <p:grpSpPr>
+        <a:xfrm>
+          <a:off x="0" y="0"/>
+          <a:ext cx="0" cy="0"/>
+          <a:chOff x="0" y="0"/>
+          <a:chExt cx="0" cy="0"/>
+        </a:xfrm>
+      </p:grpSpPr>
+      <p:sp>
+        <p:nvSpPr>
+          <p:cNvPr id="2" name="Title 1">
+            <a:extLst>
+              <a:ext uri="{FF2B5EF4-FFF2-40B4-BE49-F238E27FC236}">
+                <a16:creationId xmlns:a16="http://schemas.microsoft.com/office/drawing/2014/main" id="{58DA36E5-BA76-FA44-A86C-E7E14E93B80E}"/>
+              </a:ext>
+            </a:extLst>
+          </p:cNvPr>
+          <p:cNvSpPr>
+            <a:spLocks noGrp="1"/>
+          </p:cNvSpPr>
+          <p:nvPr>
+            <p:ph type="title"/>
+          </p:nvPr>
+        </p:nvSpPr>
+        <p:spPr/>
+        <p:txBody>
+          <a:bodyPr/>
+          <a:lstStyle/>
+          <a:p>
+            <a:r>
+              <a:rPr lang="en-US" dirty="0">
+                <a:highlight>
+                  <a:srgbClr val="FFFF00"/>
+                </a:highlight>
+              </a:rPr>
+              <a:t>Related Work</a:t>
+            </a:r>
+          </a:p>
+        </p:txBody>
+      </p:sp>
+      <p:sp>
+        <p:nvSpPr>
+          <p:cNvPr id="8" name="TextBox 7">
+            <a:extLst>
+              <a:ext uri="{FF2B5EF4-FFF2-40B4-BE49-F238E27FC236}">
+                <a16:creationId xmlns:a16="http://schemas.microsoft.com/office/drawing/2014/main" id="{04297640-152C-D142-8D22-6BBDAAF3D37B}"/>
+              </a:ext>
+            </a:extLst>
+          </p:cNvPr>
+          <p:cNvSpPr txBox="1"/>
+          <p:nvPr/>
+        </p:nvSpPr>
+        <p:spPr>
+          <a:xfrm>
+            <a:off x="267629" y="2241395"/>
+            <a:ext cx="4440399" cy="2862322"/>
+          </a:xfrm>
+          <a:prstGeom prst="rect">
+            <a:avLst/>
+          </a:prstGeom>
+          <a:noFill/>
+        </p:spPr>
+        <p:txBody>
+          <a:bodyPr wrap="square" rtlCol="0">
+            <a:spAutoFit/>
+          </a:bodyPr>
+          <a:lstStyle/>
+          <a:p>
+            <a:pPr marL="342900" indent="-342900">
+              <a:buFont typeface="+mj-lt"/>
+              <a:buAutoNum type="arabicPeriod"/>
+            </a:pPr>
+            <a:r>
+              <a:rPr lang="en-US" dirty="0"/>
+              <a:t>How does the level of noise low vs high impact creativity and cognitive function</a:t>
+            </a:r>
+          </a:p>
+          <a:p>
+            <a:pPr marL="342900" indent="-342900">
+              <a:buFont typeface="+mj-lt"/>
+              <a:buAutoNum type="arabicPeriod"/>
+            </a:pPr>
+            <a:r>
+              <a:rPr lang="en-US" dirty="0"/>
+              <a:t>RAT, user feedback</a:t>
+            </a:r>
+          </a:p>
+          <a:p>
+            <a:pPr marL="342900" indent="-342900">
+              <a:buFont typeface="+mj-lt"/>
+              <a:buAutoNum type="arabicPeriod"/>
+            </a:pPr>
+            <a:r>
+              <a:rPr lang="en-US" dirty="0"/>
+              <a:t>Multiple </a:t>
+            </a:r>
+            <a:r>
+              <a:rPr lang="en-US" dirty="0" err="1"/>
+              <a:t>experements</a:t>
+            </a:r>
+            <a:r>
+              <a:rPr lang="en-US" dirty="0"/>
+              <a:t> testing user interaction and gathering data manually from users</a:t>
+            </a:r>
+          </a:p>
+          <a:p>
+            <a:pPr marL="342900" indent="-342900">
+              <a:buFont typeface="+mj-lt"/>
+              <a:buAutoNum type="arabicPeriod"/>
+            </a:pPr>
+            <a:r>
+              <a:rPr lang="en-US" dirty="0"/>
+              <a:t>Most were computer based tasks but varied in some way to narrow down bias </a:t>
+            </a:r>
+          </a:p>
+          <a:p>
+            <a:pPr marL="342900" indent="-342900">
+              <a:buFont typeface="+mj-lt"/>
+              <a:buAutoNum type="arabicPeriod"/>
+            </a:pPr>
+            <a:r>
+              <a:rPr lang="en-US" dirty="0"/>
+              <a:t>They were able to classify emotions to within 98% accuracy</a:t>
+            </a:r>
+          </a:p>
+        </p:txBody>
+      </p:sp>
+      <p:pic>
+        <p:nvPicPr>
+          <p:cNvPr id="6" name="Picture 5" descr="A picture containing text&#10;&#10;Description automatically generated">
+            <a:extLst>
+              <a:ext uri="{FF2B5EF4-FFF2-40B4-BE49-F238E27FC236}">
+                <a16:creationId xmlns:a16="http://schemas.microsoft.com/office/drawing/2014/main" id="{0B1FAC38-3C83-4439-8279-8E033A39CC32}"/>
+              </a:ext>
+            </a:extLst>
+          </p:cNvPr>
+          <p:cNvPicPr>
+            <a:picLocks noChangeAspect="1"/>
+          </p:cNvPicPr>
+          <p:nvPr/>
+        </p:nvPicPr>
+        <p:blipFill>
+          <a:blip r:embed="rId2">
+            <a:extLst>
+              <a:ext uri="{28A0092B-C50C-407E-A947-70E740481C1C}">
+                <a14:useLocalDpi xmlns:a14="http://schemas.microsoft.com/office/drawing/2010/main" val="0"/>
+              </a:ext>
+            </a:extLst>
+          </a:blip>
+          <a:stretch>
+            <a:fillRect/>
+          </a:stretch>
+        </p:blipFill>
+        <p:spPr>
+          <a:xfrm>
+            <a:off x="5438919" y="1237909"/>
+            <a:ext cx="6356677" cy="1689187"/>
+          </a:xfrm>
+          <a:prstGeom prst="rect">
+            <a:avLst/>
+          </a:prstGeom>
+        </p:spPr>
+      </p:pic>
+    </p:spTree>
+    <p:extLst>
+      <p:ext uri="{BB962C8B-B14F-4D97-AF65-F5344CB8AC3E}">
+        <p14:creationId xmlns:p14="http://schemas.microsoft.com/office/powerpoint/2010/main" val="327575506"/>
+      </p:ext>
+    </p:extLst>
+  </p:cSld>
+  <p:clrMapOvr>
+    <a:masterClrMapping/>
+  </p:clrMapOvr>
+</p:sld>
+</file>
+
+<file path=ppt/slides/slide16.xml><?xml version="1.0" encoding="utf-8"?>
+<p:sld xmlns:a="http://schemas.openxmlformats.org/drawingml/2006/main" xmlns:r="http://schemas.openxmlformats.org/officeDocument/2006/relationships" xmlns:p="http://schemas.openxmlformats.org/presentationml/2006/main">
+  <p:cSld>
+    <p:spTree>
+      <p:nvGrpSpPr>
+        <p:cNvPr id="1" name=""/>
+        <p:cNvGrpSpPr/>
+        <p:nvPr/>
+      </p:nvGrpSpPr>
+      <p:grpSpPr>
+        <a:xfrm>
+          <a:off x="0" y="0"/>
+          <a:ext cx="0" cy="0"/>
+          <a:chOff x="0" y="0"/>
+          <a:chExt cx="0" cy="0"/>
+        </a:xfrm>
+      </p:grpSpPr>
+      <p:sp>
+        <p:nvSpPr>
+          <p:cNvPr id="2" name="Title 1">
+            <a:extLst>
+              <a:ext uri="{FF2B5EF4-FFF2-40B4-BE49-F238E27FC236}">
                 <a16:creationId xmlns:a16="http://schemas.microsoft.com/office/drawing/2014/main" id="{D32F7995-CBED-4F49-A236-5E5EADD4F5E7}"/>
               </a:ext>
             </a:extLst>
@@ -4363,7 +4735,10 @@
           <a:bodyPr/>
           <a:lstStyle/>
           <a:p>
-            <a:endParaRPr lang="en-US"/>
+            <a:r>
+              <a:rPr lang="en-US" dirty="0"/>
+              <a:t>Previous slide</a:t>
+            </a:r>
           </a:p>
         </p:txBody>
       </p:sp>
@@ -4395,6 +4770,41 @@
               <a:t>https://dl.acm.org/doi/abs/10.1145/3334480.3381446</a:t>
             </a:r>
             <a:endParaRPr lang="en-US" dirty="0"/>
+          </a:p>
+        </p:txBody>
+      </p:sp>
+      <p:sp>
+        <p:nvSpPr>
+          <p:cNvPr id="7" name="TextBox 6">
+            <a:extLst>
+              <a:ext uri="{FF2B5EF4-FFF2-40B4-BE49-F238E27FC236}">
+                <a16:creationId xmlns:a16="http://schemas.microsoft.com/office/drawing/2014/main" id="{90C7DFC7-4FA8-4015-BF1D-29F70175A04C}"/>
+              </a:ext>
+            </a:extLst>
+          </p:cNvPr>
+          <p:cNvSpPr txBox="1"/>
+          <p:nvPr/>
+        </p:nvSpPr>
+        <p:spPr>
+          <a:xfrm>
+            <a:off x="1020932" y="3249227"/>
+            <a:ext cx="7111014" cy="369332"/>
+          </a:xfrm>
+          <a:prstGeom prst="rect">
+            <a:avLst/>
+          </a:prstGeom>
+          <a:noFill/>
+        </p:spPr>
+        <p:txBody>
+          <a:bodyPr wrap="square" rtlCol="0">
+            <a:spAutoFit/>
+          </a:bodyPr>
+          <a:lstStyle/>
+          <a:p>
+            <a:r>
+              <a:rPr lang="en-US" dirty="0"/>
+              <a:t>Cannot access title only abstract</a:t>
+            </a:r>
           </a:p>
         </p:txBody>
       </p:sp>
@@ -4479,16 +4889,13 @@
           <a:p>
             <a:r>
               <a:rPr lang="en-US" dirty="0"/>
-              <a:t>Many papers have been published about how engineers approach problem solving and ideas differently than other non engineering individuals. This engineering mindset is said to be a more problem orientated approach and analytical than the typical persons thought pattern. But does this shift in thinking actually result in a readable process in the brain? </a:t>
-            </a:r>
-            <a:r>
-              <a:rPr lang="en-US" i="1" dirty="0">
-                <a:highlight>
-                  <a:srgbClr val="FFFF00"/>
-                </a:highlight>
-              </a:rPr>
-              <a:t>[My concern is that maybe this question is already answered. That’s the risk of tapping another field (brain science). We need to look at the literature to make sure we’re not reinventing the wheel or trying to answer something that’s already answered.]</a:t>
-            </a:r>
+              <a:t>Many papers have been published about how engineers approach problem solving and ideas differently than other non engineering individuals. But the emotions that individuals experience while coding shift depending on the type of code and their knowledgeability of the specific task. Other factors may also factor code performance and emotion such as music </a:t>
+            </a:r>
+            <a:endParaRPr lang="en-US" i="1" dirty="0">
+              <a:highlight>
+                <a:srgbClr val="FFFF00"/>
+              </a:highlight>
+            </a:endParaRPr>
           </a:p>
         </p:txBody>
       </p:sp>
@@ -4655,7 +5062,7 @@
         <p:spPr/>
         <p:txBody>
           <a:bodyPr>
-            <a:normAutofit fontScale="62500" lnSpcReduction="20000"/>
+            <a:normAutofit/>
           </a:bodyPr>
           <a:lstStyle/>
           <a:p>
@@ -4670,7 +5077,7 @@
             </a:r>
             <a:r>
               <a:rPr lang="en-US" dirty="0"/>
-              <a:t> device can we tell the difference between a lay individual and an expert given their </a:t>
+              <a:t> device can we tell the difference in emotion and state between a lay individual and an expert given their </a:t>
             </a:r>
             <a:r>
               <a:rPr lang="en-US" dirty="0" err="1"/>
@@ -4678,7 +5085,21 @@
             </a:r>
             <a:r>
               <a:rPr lang="en-US" dirty="0"/>
-              <a:t> data while performing a moderate CS task?</a:t>
+              <a:t> data while performing a moderate CS task? (that is can we predict a knowledgeable computer scientist and entry level user given the emotion data)</a:t>
+            </a:r>
+          </a:p>
+          <a:p>
+            <a:pPr lvl="1"/>
+            <a:r>
+              <a:rPr lang="en-US" dirty="0"/>
+              <a:t>What effect do different factors such as music and bad styling have on the emotion of a developer,</a:t>
+            </a:r>
+          </a:p>
+          <a:p>
+            <a:pPr lvl="2"/>
+            <a:r>
+              <a:rPr lang="en-US" dirty="0"/>
+              <a:t> does this have the same effect on a lay individual.</a:t>
             </a:r>
           </a:p>
           <a:p>
@@ -4686,142 +5107,38 @@
             <a:endParaRPr lang="en-US" dirty="0"/>
           </a:p>
           <a:p>
-            <a:pPr lvl="1"/>
-            <a:r>
-              <a:rPr lang="en-US" dirty="0"/>
-              <a:t>Given a range of individuals trained in computer science can we tell their level of experience given their </a:t>
-            </a:r>
-            <a:r>
-              <a:rPr lang="en-US" dirty="0" err="1"/>
-              <a:t>eeg</a:t>
-            </a:r>
-            <a:r>
-              <a:rPr lang="en-US" dirty="0"/>
-              <a:t> data?</a:t>
-            </a:r>
+            <a:pPr marL="914400" lvl="2" indent="0">
+              <a:buNone/>
+            </a:pPr>
+            <a:endParaRPr lang="en-US" dirty="0"/>
           </a:p>
           <a:p>
             <a:pPr marL="457200" lvl="1" indent="0">
               <a:buNone/>
             </a:pPr>
             <a:r>
-              <a:rPr lang="en-US" i="1" dirty="0">
-                <a:highlight>
-                  <a:srgbClr val="FFFF00"/>
-                </a:highlight>
+              <a:rPr lang="en-US" dirty="0">
+                <a:hlinkClick r:id="rId2"/>
               </a:rPr>
-              <a:t>Doesn’t the ICPC’19 paper (in the related work section) answer this question (or a similar question)? “Can we relate expertise to classification accuracy?”</a:t>
-            </a:r>
+              <a:t>https://journals.sagepub.com/doi/abs/10.1177/0305735605050650</a:t>
+            </a:r>
+            <a:endParaRPr lang="en-US" dirty="0"/>
           </a:p>
           <a:p>
             <a:pPr marL="457200" lvl="1" indent="0">
               <a:buNone/>
             </a:pPr>
+            <a:r>
+              <a:rPr lang="en-US" dirty="0">
+                <a:hlinkClick r:id="rId3"/>
+              </a:rPr>
+              <a:t>https://academic.oup.com/jcr/article-abstract/39/4/784/1798283?redirectedFrom=fulltext</a:t>
+            </a:r>
             <a:endParaRPr lang="en-US" i="1" dirty="0">
               <a:highlight>
                 <a:srgbClr val="FFFF00"/>
               </a:highlight>
             </a:endParaRPr>
-          </a:p>
-          <a:p>
-            <a:pPr marL="457200" lvl="1" indent="0">
-              <a:buNone/>
-            </a:pPr>
-            <a:r>
-              <a:rPr lang="en-US" i="1" dirty="0">
-                <a:highlight>
-                  <a:srgbClr val="FFFF00"/>
-                </a:highlight>
-              </a:rPr>
-              <a:t>Some more specific questions:</a:t>
-            </a:r>
-          </a:p>
-          <a:p>
-            <a:pPr marL="457200" lvl="1" indent="0">
-              <a:buNone/>
-            </a:pPr>
-            <a:r>
-              <a:rPr lang="en-US" i="1" dirty="0">
-                <a:highlight>
-                  <a:srgbClr val="FFFF00"/>
-                </a:highlight>
-              </a:rPr>
-              <a:t>They’re more specific on the context of the tasks the developers are asked to perform and on the context of what metrics we’re applying.</a:t>
-            </a:r>
-          </a:p>
-          <a:p>
-            <a:pPr lvl="1"/>
-            <a:r>
-              <a:rPr lang="en-US" i="1" dirty="0">
-                <a:highlight>
-                  <a:srgbClr val="FFFF00"/>
-                </a:highlight>
-              </a:rPr>
-              <a:t>How and to what extent developers’ brain performance vary while coding with and without listening to music? </a:t>
-            </a:r>
-          </a:p>
-          <a:p>
-            <a:pPr lvl="1"/>
-            <a:r>
-              <a:rPr lang="en-US" i="1" dirty="0">
-                <a:highlight>
-                  <a:srgbClr val="FFFF00"/>
-                </a:highlight>
-              </a:rPr>
-              <a:t>How and to what extent developers’ brain performance vary while maintaining code with different quality[or complexity or style or …]? </a:t>
-            </a:r>
-          </a:p>
-          <a:p>
-            <a:pPr lvl="1"/>
-            <a:r>
-              <a:rPr lang="en-US" i="1" dirty="0">
-                <a:highlight>
-                  <a:srgbClr val="FFFF00"/>
-                </a:highlight>
-              </a:rPr>
-              <a:t>Do developers feel less stressed and more engaged and focused while coding listening to music?</a:t>
-            </a:r>
-          </a:p>
-          <a:p>
-            <a:pPr lvl="1"/>
-            <a:r>
-              <a:rPr lang="en-US" i="1" dirty="0">
-                <a:highlight>
-                  <a:srgbClr val="FFFF00"/>
-                </a:highlight>
-              </a:rPr>
-              <a:t>Do developers feel more stressed and less engaged while reading code with ‘one-liners abuse’ [or coding not following standard style guidelines]?</a:t>
-            </a:r>
-          </a:p>
-          <a:p>
-            <a:pPr lvl="1"/>
-            <a:r>
-              <a:rPr lang="en-US" i="1" dirty="0">
-                <a:highlight>
-                  <a:srgbClr val="FFFF00"/>
-                </a:highlight>
-              </a:rPr>
-              <a:t>[Or a questions for a replication study] </a:t>
-            </a:r>
-            <a:r>
-              <a:rPr lang="en-US" dirty="0">
-                <a:highlight>
-                  <a:srgbClr val="FFFF00"/>
-                </a:highlight>
-              </a:rPr>
-              <a:t>How does surprisal in source code influence developers’ brain?</a:t>
-            </a:r>
-          </a:p>
-          <a:p>
-            <a:pPr lvl="2"/>
-            <a:r>
-              <a:rPr lang="en-US" i="1" dirty="0">
-                <a:highlight>
-                  <a:srgbClr val="FFFF00"/>
-                </a:highlight>
-              </a:rPr>
-              <a:t>As a replication study, we would use the same questions, code snippets, etc. However, measuring brain signal and brain performance metrics, rather than accuracy and correctness (the metrics they measured in their RQs. We can measure them as well for comparison reasons, but we’d be looking at different outcomes)</a:t>
-            </a:r>
           </a:p>
         </p:txBody>
       </p:sp>

</xml_diff>

<commit_message>
Updating the pptx with notes taken during last meeting
</commit_message>
<xml_diff>
--- a/Thesis Idea.pptx
+++ b/Thesis Idea.pptx
@@ -272,7 +272,7 @@
           <a:p>
             <a:fld id="{00284868-4315-4427-9D14-6A5CD0C97C48}" type="datetimeFigureOut">
               <a:rPr lang="en-US" smtClean="0"/>
-              <a:t>12/1/2020</a:t>
+              <a:t>12/2/20</a:t>
             </a:fld>
             <a:endParaRPr lang="en-US"/>
           </a:p>
@@ -470,7 +470,7 @@
           <a:p>
             <a:fld id="{00284868-4315-4427-9D14-6A5CD0C97C48}" type="datetimeFigureOut">
               <a:rPr lang="en-US" smtClean="0"/>
-              <a:t>12/1/2020</a:t>
+              <a:t>12/2/20</a:t>
             </a:fld>
             <a:endParaRPr lang="en-US"/>
           </a:p>
@@ -678,7 +678,7 @@
           <a:p>
             <a:fld id="{00284868-4315-4427-9D14-6A5CD0C97C48}" type="datetimeFigureOut">
               <a:rPr lang="en-US" smtClean="0"/>
-              <a:t>12/1/2020</a:t>
+              <a:t>12/2/20</a:t>
             </a:fld>
             <a:endParaRPr lang="en-US"/>
           </a:p>
@@ -876,7 +876,7 @@
           <a:p>
             <a:fld id="{00284868-4315-4427-9D14-6A5CD0C97C48}" type="datetimeFigureOut">
               <a:rPr lang="en-US" smtClean="0"/>
-              <a:t>12/1/2020</a:t>
+              <a:t>12/2/20</a:t>
             </a:fld>
             <a:endParaRPr lang="en-US"/>
           </a:p>
@@ -1151,7 +1151,7 @@
           <a:p>
             <a:fld id="{00284868-4315-4427-9D14-6A5CD0C97C48}" type="datetimeFigureOut">
               <a:rPr lang="en-US" smtClean="0"/>
-              <a:t>12/1/2020</a:t>
+              <a:t>12/2/20</a:t>
             </a:fld>
             <a:endParaRPr lang="en-US"/>
           </a:p>
@@ -1416,7 +1416,7 @@
           <a:p>
             <a:fld id="{00284868-4315-4427-9D14-6A5CD0C97C48}" type="datetimeFigureOut">
               <a:rPr lang="en-US" smtClean="0"/>
-              <a:t>12/1/2020</a:t>
+              <a:t>12/2/20</a:t>
             </a:fld>
             <a:endParaRPr lang="en-US"/>
           </a:p>
@@ -1828,7 +1828,7 @@
           <a:p>
             <a:fld id="{00284868-4315-4427-9D14-6A5CD0C97C48}" type="datetimeFigureOut">
               <a:rPr lang="en-US" smtClean="0"/>
-              <a:t>12/1/2020</a:t>
+              <a:t>12/2/20</a:t>
             </a:fld>
             <a:endParaRPr lang="en-US"/>
           </a:p>
@@ -1969,7 +1969,7 @@
           <a:p>
             <a:fld id="{00284868-4315-4427-9D14-6A5CD0C97C48}" type="datetimeFigureOut">
               <a:rPr lang="en-US" smtClean="0"/>
-              <a:t>12/1/2020</a:t>
+              <a:t>12/2/20</a:t>
             </a:fld>
             <a:endParaRPr lang="en-US"/>
           </a:p>
@@ -2082,7 +2082,7 @@
           <a:p>
             <a:fld id="{00284868-4315-4427-9D14-6A5CD0C97C48}" type="datetimeFigureOut">
               <a:rPr lang="en-US" smtClean="0"/>
-              <a:t>12/1/2020</a:t>
+              <a:t>12/2/20</a:t>
             </a:fld>
             <a:endParaRPr lang="en-US"/>
           </a:p>
@@ -2393,7 +2393,7 @@
           <a:p>
             <a:fld id="{00284868-4315-4427-9D14-6A5CD0C97C48}" type="datetimeFigureOut">
               <a:rPr lang="en-US" smtClean="0"/>
-              <a:t>12/1/2020</a:t>
+              <a:t>12/2/20</a:t>
             </a:fld>
             <a:endParaRPr lang="en-US"/>
           </a:p>
@@ -2681,7 +2681,7 @@
           <a:p>
             <a:fld id="{00284868-4315-4427-9D14-6A5CD0C97C48}" type="datetimeFigureOut">
               <a:rPr lang="en-US" smtClean="0"/>
-              <a:t>12/1/2020</a:t>
+              <a:t>12/2/20</a:t>
             </a:fld>
             <a:endParaRPr lang="en-US"/>
           </a:p>
@@ -2922,7 +2922,7 @@
           <a:p>
             <a:fld id="{00284868-4315-4427-9D14-6A5CD0C97C48}" type="datetimeFigureOut">
               <a:rPr lang="en-US" smtClean="0"/>
-              <a:t>12/1/2020</a:t>
+              <a:t>12/2/20</a:t>
             </a:fld>
             <a:endParaRPr lang="en-US"/>
           </a:p>
@@ -4553,24 +4553,25 @@
             </a:r>
           </a:p>
           <a:p>
+            <a:pPr lvl="2"/>
+            <a:r>
+              <a:rPr lang="en-US" i="1" dirty="0"/>
+              <a:t>Are there emotion patterns across different levels of programming experience when reading or writing code?</a:t>
+            </a:r>
+          </a:p>
+          <a:p>
+            <a:pPr lvl="2"/>
+            <a:r>
+              <a:rPr lang="en-US" i="1" dirty="0"/>
+              <a:t>Do people Trained in Computer science have different thought [brain activation/signal] patterns while preforming CS tasks than those who have little to no training?</a:t>
+            </a:r>
+          </a:p>
+          <a:p>
             <a:pPr lvl="1"/>
             <a:r>
               <a:rPr lang="en-US" dirty="0"/>
-              <a:t>What affect does code style have on emotions of developers and their level of comprehension?</a:t>
-            </a:r>
-          </a:p>
-          <a:p>
-            <a:pPr lvl="1"/>
-            <a:r>
-              <a:rPr lang="en-US" dirty="0"/>
-              <a:t>Do people Trained in Computer science have different thought patterns while preforming CS tasks than those who have little to no training?</a:t>
-            </a:r>
-          </a:p>
-          <a:p>
-            <a:pPr marL="914400" lvl="2" indent="0">
-              <a:buNone/>
-            </a:pPr>
-            <a:endParaRPr lang="en-US" dirty="0"/>
+              <a:t>What effect does code style have on emotions of developers and their level of comprehension?</a:t>
+            </a:r>
           </a:p>
           <a:p>
             <a:pPr marL="457200" lvl="1" indent="0">
@@ -4685,15 +4686,7 @@
           <a:p>
             <a:r>
               <a:rPr lang="en-US" dirty="0"/>
-              <a:t>Have different tasks for the </a:t>
-            </a:r>
-            <a:r>
-              <a:rPr lang="en-US" dirty="0" err="1"/>
-              <a:t>participents</a:t>
-            </a:r>
-            <a:r>
-              <a:rPr lang="en-US" dirty="0"/>
-              <a:t> to go through, Write a simple array copy program, do a code review of a well type program, do a code review of a program that has a different style but does the same thing.</a:t>
+              <a:t>Have different tasks for the participants to go through, Write a simple array copy program, do a code review of a well type program, do a code review of a program that has a different style but does the same thing.</a:t>
             </a:r>
           </a:p>
           <a:p>

</xml_diff>